<commit_message>
Präsentation Task 2 vervollständigt
</commit_message>
<xml_diff>
--- a/presentation_task1/presentation_1_data_challenges_v02.pptx
+++ b/presentation_task1/presentation_1_data_challenges_v02.pptx
@@ -5,7 +5,7 @@
     <p:sldMasterId id="2147483690" r:id="rId1"/>
   </p:sldMasterIdLst>
   <p:notesMasterIdLst>
-    <p:notesMasterId r:id="rId14"/>
+    <p:notesMasterId r:id="rId15"/>
   </p:notesMasterIdLst>
   <p:sldIdLst>
     <p:sldId id="293" r:id="rId2"/>
@@ -13,18 +13,19 @@
     <p:sldId id="258" r:id="rId4"/>
     <p:sldId id="294" r:id="rId5"/>
     <p:sldId id="295" r:id="rId6"/>
-    <p:sldId id="290" r:id="rId7"/>
-    <p:sldId id="296" r:id="rId8"/>
-    <p:sldId id="291" r:id="rId9"/>
-    <p:sldId id="292" r:id="rId10"/>
-    <p:sldId id="297" r:id="rId11"/>
-    <p:sldId id="289" r:id="rId12"/>
-    <p:sldId id="298" r:id="rId13"/>
+    <p:sldId id="299" r:id="rId7"/>
+    <p:sldId id="290" r:id="rId8"/>
+    <p:sldId id="296" r:id="rId9"/>
+    <p:sldId id="291" r:id="rId10"/>
+    <p:sldId id="292" r:id="rId11"/>
+    <p:sldId id="297" r:id="rId12"/>
+    <p:sldId id="289" r:id="rId13"/>
+    <p:sldId id="298" r:id="rId14"/>
   </p:sldIdLst>
   <p:sldSz cx="12192000" cy="6858000"/>
   <p:notesSz cx="6858000" cy="9144000"/>
   <p:custDataLst>
-    <p:tags r:id="rId15"/>
+    <p:tags r:id="rId16"/>
   </p:custDataLst>
   <p:defaultTextStyle>
     <a:defPPr>
@@ -3649,7 +3650,7 @@
             </a:br>
             <a:r>
               <a:rPr lang="de-DE" sz="2000" dirty="0"/>
-              <a:t>Tobias, </a:t>
+              <a:t>Tobias Ettling 6753746 ,</a:t>
             </a:r>
             <a:br>
               <a:rPr lang="de-DE" sz="2000" dirty="0"/>
@@ -3914,7 +3915,7 @@
           <a:p>
             <a:r>
               <a:rPr lang="de-DE" sz="2400" noProof="0" dirty="0" err="1"/>
-              <a:t>Examplatory</a:t>
+              <a:t>We</a:t>
             </a:r>
             <a:r>
               <a:rPr lang="de-DE" sz="2400" noProof="0" dirty="0"/>
@@ -3922,7 +3923,7 @@
             </a:r>
             <a:r>
               <a:rPr lang="de-DE" sz="2400" noProof="0" dirty="0" err="1"/>
-              <a:t>screenshot</a:t>
+              <a:t>chose</a:t>
             </a:r>
             <a:r>
               <a:rPr lang="de-DE" sz="2400" noProof="0" dirty="0"/>
@@ -3930,19 +3931,182 @@
             </a:r>
             <a:r>
               <a:rPr lang="de-DE" sz="2400" noProof="0" dirty="0" err="1"/>
-              <a:t>of</a:t>
+              <a:t>streamlit</a:t>
             </a:r>
             <a:r>
               <a:rPr lang="de-DE" sz="2400" noProof="0" dirty="0"/>
-              <a:t> final </a:t>
+              <a:t> after </a:t>
             </a:r>
             <a:r>
               <a:rPr lang="de-DE" sz="2400" noProof="0" dirty="0" err="1"/>
-              <a:t>result</a:t>
+              <a:t>comparing</a:t>
             </a:r>
             <a:r>
               <a:rPr lang="de-DE" sz="2400" noProof="0" dirty="0"/>
-              <a:t>:</a:t>
+              <a:t> </a:t>
+            </a:r>
+            <a:r>
+              <a:rPr lang="de-DE" sz="2400" noProof="0" dirty="0" err="1"/>
+              <a:t>it</a:t>
+            </a:r>
+            <a:r>
+              <a:rPr lang="de-DE" sz="2400" noProof="0" dirty="0"/>
+              <a:t> </a:t>
+            </a:r>
+            <a:r>
+              <a:rPr lang="de-DE" sz="2400" noProof="0" dirty="0" err="1"/>
+              <a:t>to</a:t>
+            </a:r>
+            <a:r>
+              <a:rPr lang="de-DE" sz="2400" noProof="0" dirty="0"/>
+              <a:t> </a:t>
+            </a:r>
+            <a:r>
+              <a:rPr lang="de-DE" sz="2400" noProof="0" dirty="0" err="1"/>
+              <a:t>popular</a:t>
+            </a:r>
+            <a:r>
+              <a:rPr lang="de-DE" sz="2400" noProof="0" dirty="0"/>
+              <a:t> alternatives</a:t>
+            </a:r>
+            <a:endParaRPr lang="de-DE" dirty="0"/>
+          </a:p>
+          <a:p>
+            <a:pPr lvl="1"/>
+            <a:r>
+              <a:rPr lang="de-DE" noProof="0" dirty="0" err="1"/>
+              <a:t>Flask</a:t>
+            </a:r>
+            <a:r>
+              <a:rPr lang="de-DE" noProof="0" dirty="0"/>
+              <a:t>: </a:t>
+            </a:r>
+            <a:r>
+              <a:rPr lang="de-DE" noProof="0" dirty="0" err="1"/>
+              <a:t>Too</a:t>
+            </a:r>
+            <a:r>
+              <a:rPr lang="de-DE" noProof="0" dirty="0"/>
+              <a:t> </a:t>
+            </a:r>
+            <a:r>
+              <a:rPr lang="de-DE" noProof="0" dirty="0" err="1"/>
+              <a:t>unspecific</a:t>
+            </a:r>
+            <a:endParaRPr lang="de-DE" noProof="0" dirty="0"/>
+          </a:p>
+          <a:p>
+            <a:pPr lvl="1"/>
+            <a:endParaRPr lang="de-DE" dirty="0"/>
+          </a:p>
+          <a:p>
+            <a:pPr lvl="1"/>
+            <a:r>
+              <a:rPr lang="de-DE" noProof="0" dirty="0" err="1"/>
+              <a:t>Plotly</a:t>
+            </a:r>
+            <a:r>
+              <a:rPr lang="de-DE" noProof="0" dirty="0"/>
+              <a:t> </a:t>
+            </a:r>
+            <a:r>
+              <a:rPr lang="de-DE" noProof="0" dirty="0" err="1"/>
+              <a:t>combined</a:t>
+            </a:r>
+            <a:r>
+              <a:rPr lang="de-DE" noProof="0" dirty="0"/>
+              <a:t> in a </a:t>
+            </a:r>
+            <a:br>
+              <a:rPr lang="de-DE" noProof="0" dirty="0"/>
+            </a:br>
+            <a:r>
+              <a:rPr lang="de-DE" noProof="0" dirty="0" err="1"/>
+              <a:t>Webframe</a:t>
+            </a:r>
+            <a:r>
+              <a:rPr lang="de-DE" noProof="0" dirty="0"/>
+              <a:t> (JavaScript): Not </a:t>
+            </a:r>
+            <a:r>
+              <a:rPr lang="de-DE" noProof="0" dirty="0" err="1"/>
+              <a:t>efficient</a:t>
+            </a:r>
+            <a:endParaRPr lang="de-DE" noProof="0" dirty="0"/>
+          </a:p>
+          <a:p>
+            <a:pPr marL="457200" lvl="1" indent="0">
+              <a:buNone/>
+            </a:pPr>
+            <a:endParaRPr lang="de-DE" dirty="0"/>
+          </a:p>
+          <a:p>
+            <a:pPr lvl="1"/>
+            <a:r>
+              <a:rPr lang="de-DE" dirty="0" err="1"/>
+              <a:t>Streamlit</a:t>
+            </a:r>
+            <a:r>
+              <a:rPr lang="de-DE" dirty="0"/>
+              <a:t>: </a:t>
+            </a:r>
+            <a:r>
+              <a:rPr lang="de-DE" dirty="0" err="1"/>
+              <a:t>Perfect</a:t>
+            </a:r>
+            <a:r>
+              <a:rPr lang="de-DE" dirty="0"/>
+              <a:t> </a:t>
+            </a:r>
+            <a:r>
+              <a:rPr lang="de-DE" dirty="0" err="1"/>
+              <a:t>solution</a:t>
+            </a:r>
+            <a:r>
+              <a:rPr lang="de-DE" dirty="0"/>
+              <a:t>,</a:t>
+            </a:r>
+            <a:br>
+              <a:rPr lang="de-DE" dirty="0"/>
+            </a:br>
+            <a:r>
+              <a:rPr lang="de-DE" dirty="0" err="1"/>
+              <a:t>specified</a:t>
+            </a:r>
+            <a:r>
+              <a:rPr lang="de-DE" dirty="0"/>
+              <a:t> </a:t>
+            </a:r>
+            <a:r>
+              <a:rPr lang="de-DE" dirty="0" err="1"/>
+              <a:t>for</a:t>
+            </a:r>
+            <a:r>
+              <a:rPr lang="de-DE" dirty="0"/>
+              <a:t> </a:t>
+            </a:r>
+            <a:r>
+              <a:rPr lang="de-DE" dirty="0" err="1"/>
+              <a:t>data</a:t>
+            </a:r>
+            <a:r>
+              <a:rPr lang="de-DE" dirty="0"/>
+              <a:t> </a:t>
+            </a:r>
+            <a:r>
+              <a:rPr lang="de-DE" dirty="0" err="1"/>
+              <a:t>analysis</a:t>
+            </a:r>
+            <a:r>
+              <a:rPr lang="de-DE" dirty="0"/>
+              <a:t> and </a:t>
+            </a:r>
+            <a:br>
+              <a:rPr lang="de-DE" dirty="0"/>
+            </a:br>
+            <a:r>
+              <a:rPr lang="de-DE" dirty="0" err="1"/>
+              <a:t>visualization</a:t>
             </a:r>
             <a:endParaRPr lang="de-DE" noProof="0" dirty="0"/>
           </a:p>
@@ -4088,10 +4252,78 @@
           </a:p>
         </p:txBody>
       </p:sp>
+      <p:pic>
+        <p:nvPicPr>
+          <p:cNvPr id="6" name="Grafik 5">
+            <a:extLst>
+              <a:ext uri="{FF2B5EF4-FFF2-40B4-BE49-F238E27FC236}">
+                <a16:creationId xmlns:a16="http://schemas.microsoft.com/office/drawing/2014/main" id="{FC646A03-F853-41D1-BB20-D4BF60AAD36E}"/>
+              </a:ext>
+            </a:extLst>
+          </p:cNvPr>
+          <p:cNvPicPr>
+            <a:picLocks noChangeAspect="1"/>
+          </p:cNvPicPr>
+          <p:nvPr/>
+        </p:nvPicPr>
+        <p:blipFill rotWithShape="1">
+          <a:blip r:embed="rId2"/>
+          <a:srcRect t="26429"/>
+          <a:stretch/>
+        </p:blipFill>
+        <p:spPr>
+          <a:xfrm>
+            <a:off x="5844161" y="3282561"/>
+            <a:ext cx="5774178" cy="2901422"/>
+          </a:xfrm>
+          <a:prstGeom prst="rect">
+            <a:avLst/>
+          </a:prstGeom>
+        </p:spPr>
+      </p:pic>
+      <p:pic>
+        <p:nvPicPr>
+          <p:cNvPr id="10" name="Grafik 9">
+            <a:extLst>
+              <a:ext uri="{FF2B5EF4-FFF2-40B4-BE49-F238E27FC236}">
+                <a16:creationId xmlns:a16="http://schemas.microsoft.com/office/drawing/2014/main" id="{3327FE70-63EA-4891-B319-9603CAEF164A}"/>
+              </a:ext>
+            </a:extLst>
+          </p:cNvPr>
+          <p:cNvPicPr>
+            <a:picLocks noChangeAspect="1"/>
+          </p:cNvPicPr>
+          <p:nvPr/>
+        </p:nvPicPr>
+        <p:blipFill>
+          <a:blip r:embed="rId3">
+            <a:extLst>
+              <a:ext uri="{28A0092B-C50C-407E-A947-70E740481C1C}">
+                <a14:useLocalDpi xmlns:a14="http://schemas.microsoft.com/office/drawing/2010/main" val="0"/>
+              </a:ext>
+              <a:ext uri="{96DAC541-7B7A-43D3-8B79-37D633B846F1}">
+                <asvg:svgBlip xmlns:asvg="http://schemas.microsoft.com/office/drawing/2016/SVG/main" r:embed="rId4"/>
+              </a:ext>
+            </a:extLst>
+          </a:blip>
+          <a:stretch>
+            <a:fillRect/>
+          </a:stretch>
+        </p:blipFill>
+        <p:spPr>
+          <a:xfrm>
+            <a:off x="7949673" y="2324390"/>
+            <a:ext cx="1563154" cy="914109"/>
+          </a:xfrm>
+          <a:prstGeom prst="rect">
+            <a:avLst/>
+          </a:prstGeom>
+        </p:spPr>
+      </p:pic>
     </p:spTree>
     <p:extLst>
       <p:ext uri="{BB962C8B-B14F-4D97-AF65-F5344CB8AC3E}">
-        <p14:creationId xmlns:p14="http://schemas.microsoft.com/office/powerpoint/2010/main" val="3843468107"/>
+        <p14:creationId xmlns:p14="http://schemas.microsoft.com/office/powerpoint/2010/main" val="4105066178"/>
       </p:ext>
     </p:extLst>
   </p:cSld>
@@ -4123,7 +4355,7 @@
           <p:cNvPr id="2" name="Titel 1">
             <a:extLst>
               <a:ext uri="{FF2B5EF4-FFF2-40B4-BE49-F238E27FC236}">
-                <a16:creationId xmlns:a16="http://schemas.microsoft.com/office/drawing/2014/main" id="{7380E37E-6F99-460C-8E27-16F021F52433}"/>
+                <a16:creationId xmlns:a16="http://schemas.microsoft.com/office/drawing/2014/main" id="{798C351B-88D7-464D-936D-5224BDD88588}"/>
               </a:ext>
             </a:extLst>
           </p:cNvPr>
@@ -4143,8 +4375,93 @@
           <a:p>
             <a:r>
               <a:rPr lang="de-DE" sz="4000" noProof="0" dirty="0"/>
-              <a:t>Outlook</a:t>
-            </a:r>
+              <a:t>4. Web </a:t>
+            </a:r>
+            <a:r>
+              <a:rPr lang="de-DE" sz="4000" noProof="0" dirty="0" err="1"/>
+              <a:t>app</a:t>
+            </a:r>
+            <a:r>
+              <a:rPr lang="de-DE" sz="4000" noProof="0" dirty="0"/>
+              <a:t> </a:t>
+            </a:r>
+            <a:r>
+              <a:rPr lang="de-DE" sz="4000" noProof="0" dirty="0" err="1"/>
+              <a:t>development</a:t>
+            </a:r>
+            <a:r>
+              <a:rPr lang="de-DE" sz="4000" noProof="0" dirty="0"/>
+              <a:t> </a:t>
+            </a:r>
+            <a:r>
+              <a:rPr lang="de-DE" sz="4000" noProof="0" dirty="0" err="1"/>
+              <a:t>framework</a:t>
+            </a:r>
+            <a:endParaRPr lang="de-DE" sz="4000" noProof="0" dirty="0"/>
+          </a:p>
+        </p:txBody>
+      </p:sp>
+      <p:sp>
+        <p:nvSpPr>
+          <p:cNvPr id="3" name="Inhaltsplatzhalter 2">
+            <a:extLst>
+              <a:ext uri="{FF2B5EF4-FFF2-40B4-BE49-F238E27FC236}">
+                <a16:creationId xmlns:a16="http://schemas.microsoft.com/office/drawing/2014/main" id="{9D66325B-3664-41ED-A4D6-0BE27DF355E6}"/>
+              </a:ext>
+            </a:extLst>
+          </p:cNvPr>
+          <p:cNvSpPr>
+            <a:spLocks noGrp="1"/>
+          </p:cNvSpPr>
+          <p:nvPr>
+            <p:ph idx="1"/>
+          </p:nvPr>
+        </p:nvSpPr>
+        <p:spPr>
+          <a:xfrm>
+            <a:off x="838200" y="1035050"/>
+            <a:ext cx="10515600" cy="5321300"/>
+          </a:xfrm>
+        </p:spPr>
+        <p:txBody>
+          <a:bodyPr>
+            <a:normAutofit/>
+          </a:bodyPr>
+          <a:lstStyle/>
+          <a:p>
+            <a:r>
+              <a:rPr lang="de-DE" sz="2400" noProof="0" dirty="0" err="1"/>
+              <a:t>Examplatory</a:t>
+            </a:r>
+            <a:r>
+              <a:rPr lang="de-DE" sz="2400" noProof="0" dirty="0"/>
+              <a:t> </a:t>
+            </a:r>
+            <a:r>
+              <a:rPr lang="de-DE" sz="2400" noProof="0" dirty="0" err="1"/>
+              <a:t>screenshot</a:t>
+            </a:r>
+            <a:r>
+              <a:rPr lang="de-DE" sz="2400" noProof="0" dirty="0"/>
+              <a:t> </a:t>
+            </a:r>
+            <a:r>
+              <a:rPr lang="de-DE" sz="2400" noProof="0" dirty="0" err="1"/>
+              <a:t>of</a:t>
+            </a:r>
+            <a:r>
+              <a:rPr lang="de-DE" sz="2400" noProof="0" dirty="0"/>
+              <a:t> final </a:t>
+            </a:r>
+            <a:r>
+              <a:rPr lang="de-DE" sz="2400" noProof="0" dirty="0" err="1"/>
+              <a:t>result</a:t>
+            </a:r>
+            <a:r>
+              <a:rPr lang="de-DE" sz="2400" noProof="0" dirty="0"/>
+              <a:t>:</a:t>
+            </a:r>
+            <a:endParaRPr lang="de-DE" noProof="0" dirty="0"/>
           </a:p>
         </p:txBody>
       </p:sp>
@@ -4153,7 +4470,7 @@
           <p:cNvPr id="13" name="Foliennummernplatzhalter 12">
             <a:extLst>
               <a:ext uri="{FF2B5EF4-FFF2-40B4-BE49-F238E27FC236}">
-                <a16:creationId xmlns:a16="http://schemas.microsoft.com/office/drawing/2014/main" id="{86BB7297-82EE-41CA-AC8B-70FBBA5DE17F}"/>
+                <a16:creationId xmlns:a16="http://schemas.microsoft.com/office/drawing/2014/main" id="{BAC74B94-09CA-45E1-A9B4-4DE9689466B1}"/>
               </a:ext>
             </a:extLst>
           </p:cNvPr>
@@ -4178,6 +4495,206 @@
               <a:rPr lang="en-US" smtClean="0"/>
               <a:pPr/>
               <a:t>11</a:t>
+            </a:fld>
+            <a:endParaRPr lang="en-US" dirty="0"/>
+          </a:p>
+        </p:txBody>
+      </p:sp>
+      <p:sp>
+        <p:nvSpPr>
+          <p:cNvPr id="5" name="Textfeld 4">
+            <a:extLst>
+              <a:ext uri="{FF2B5EF4-FFF2-40B4-BE49-F238E27FC236}">
+                <a16:creationId xmlns:a16="http://schemas.microsoft.com/office/drawing/2014/main" id="{B56B3BFD-85E7-4729-A539-F6DEDE197149}"/>
+              </a:ext>
+            </a:extLst>
+          </p:cNvPr>
+          <p:cNvSpPr txBox="1"/>
+          <p:nvPr/>
+        </p:nvSpPr>
+        <p:spPr>
+          <a:xfrm>
+            <a:off x="838200" y="6400412"/>
+            <a:ext cx="6921500" cy="276999"/>
+          </a:xfrm>
+          <a:prstGeom prst="rect">
+            <a:avLst/>
+          </a:prstGeom>
+          <a:noFill/>
+        </p:spPr>
+        <p:txBody>
+          <a:bodyPr wrap="square" rtlCol="0">
+            <a:spAutoFit/>
+          </a:bodyPr>
+          <a:lstStyle/>
+          <a:p>
+            <a:r>
+              <a:rPr lang="de-DE" sz="1200" dirty="0">
+                <a:solidFill>
+                  <a:schemeClr val="bg1">
+                    <a:lumMod val="50000"/>
+                  </a:schemeClr>
+                </a:solidFill>
+                <a:latin typeface="Frutiger Next LT W1G"/>
+              </a:rPr>
+              <a:t>4. Web </a:t>
+            </a:r>
+            <a:r>
+              <a:rPr lang="de-DE" sz="1200" dirty="0" err="1">
+                <a:solidFill>
+                  <a:schemeClr val="bg1">
+                    <a:lumMod val="50000"/>
+                  </a:schemeClr>
+                </a:solidFill>
+                <a:latin typeface="Frutiger Next LT W1G"/>
+              </a:rPr>
+              <a:t>app</a:t>
+            </a:r>
+            <a:r>
+              <a:rPr lang="de-DE" sz="1200" dirty="0">
+                <a:solidFill>
+                  <a:schemeClr val="bg1">
+                    <a:lumMod val="50000"/>
+                  </a:schemeClr>
+                </a:solidFill>
+                <a:latin typeface="Frutiger Next LT W1G"/>
+              </a:rPr>
+              <a:t> </a:t>
+            </a:r>
+            <a:r>
+              <a:rPr lang="de-DE" sz="1200" dirty="0" err="1">
+                <a:solidFill>
+                  <a:schemeClr val="bg1">
+                    <a:lumMod val="50000"/>
+                  </a:schemeClr>
+                </a:solidFill>
+                <a:latin typeface="Frutiger Next LT W1G"/>
+              </a:rPr>
+              <a:t>development</a:t>
+            </a:r>
+            <a:r>
+              <a:rPr lang="de-DE" sz="1200" dirty="0">
+                <a:solidFill>
+                  <a:schemeClr val="bg1">
+                    <a:lumMod val="50000"/>
+                  </a:schemeClr>
+                </a:solidFill>
+                <a:latin typeface="Frutiger Next LT W1G"/>
+              </a:rPr>
+              <a:t> </a:t>
+            </a:r>
+            <a:r>
+              <a:rPr lang="de-DE" sz="1200" dirty="0" err="1">
+                <a:solidFill>
+                  <a:schemeClr val="bg1">
+                    <a:lumMod val="50000"/>
+                  </a:schemeClr>
+                </a:solidFill>
+                <a:latin typeface="Frutiger Next LT W1G"/>
+              </a:rPr>
+              <a:t>framework</a:t>
+            </a:r>
+            <a:endParaRPr lang="de-DE" sz="1200" dirty="0">
+              <a:solidFill>
+                <a:schemeClr val="bg1">
+                  <a:lumMod val="50000"/>
+                </a:schemeClr>
+              </a:solidFill>
+              <a:latin typeface="Frutiger Next LT W1G"/>
+            </a:endParaRPr>
+          </a:p>
+        </p:txBody>
+      </p:sp>
+    </p:spTree>
+    <p:extLst>
+      <p:ext uri="{BB962C8B-B14F-4D97-AF65-F5344CB8AC3E}">
+        <p14:creationId xmlns:p14="http://schemas.microsoft.com/office/powerpoint/2010/main" val="3843468107"/>
+      </p:ext>
+    </p:extLst>
+  </p:cSld>
+  <p:clrMapOvr>
+    <a:masterClrMapping/>
+  </p:clrMapOvr>
+</p:sld>
+</file>
+
+<file path=ppt/slides/slide12.xml><?xml version="1.0" encoding="utf-8"?>
+<p:sld xmlns:a="http://schemas.openxmlformats.org/drawingml/2006/main" xmlns:r="http://schemas.openxmlformats.org/officeDocument/2006/relationships" xmlns:p="http://schemas.openxmlformats.org/presentationml/2006/main">
+  <p:cSld>
+    <p:spTree>
+      <p:nvGrpSpPr>
+        <p:cNvPr id="1" name=""/>
+        <p:cNvGrpSpPr/>
+        <p:nvPr/>
+      </p:nvGrpSpPr>
+      <p:grpSpPr>
+        <a:xfrm>
+          <a:off x="0" y="0"/>
+          <a:ext cx="0" cy="0"/>
+          <a:chOff x="0" y="0"/>
+          <a:chExt cx="0" cy="0"/>
+        </a:xfrm>
+      </p:grpSpPr>
+      <p:sp>
+        <p:nvSpPr>
+          <p:cNvPr id="2" name="Titel 1">
+            <a:extLst>
+              <a:ext uri="{FF2B5EF4-FFF2-40B4-BE49-F238E27FC236}">
+                <a16:creationId xmlns:a16="http://schemas.microsoft.com/office/drawing/2014/main" id="{7380E37E-6F99-460C-8E27-16F021F52433}"/>
+              </a:ext>
+            </a:extLst>
+          </p:cNvPr>
+          <p:cNvSpPr>
+            <a:spLocks noGrp="1"/>
+          </p:cNvSpPr>
+          <p:nvPr>
+            <p:ph type="title"/>
+          </p:nvPr>
+        </p:nvSpPr>
+        <p:spPr/>
+        <p:txBody>
+          <a:bodyPr>
+            <a:normAutofit/>
+          </a:bodyPr>
+          <a:lstStyle/>
+          <a:p>
+            <a:r>
+              <a:rPr lang="de-DE" sz="4000" noProof="0" dirty="0"/>
+              <a:t>Outlook</a:t>
+            </a:r>
+          </a:p>
+        </p:txBody>
+      </p:sp>
+      <p:sp>
+        <p:nvSpPr>
+          <p:cNvPr id="13" name="Foliennummernplatzhalter 12">
+            <a:extLst>
+              <a:ext uri="{FF2B5EF4-FFF2-40B4-BE49-F238E27FC236}">
+                <a16:creationId xmlns:a16="http://schemas.microsoft.com/office/drawing/2014/main" id="{86BB7297-82EE-41CA-AC8B-70FBBA5DE17F}"/>
+              </a:ext>
+            </a:extLst>
+          </p:cNvPr>
+          <p:cNvSpPr>
+            <a:spLocks noGrp="1"/>
+          </p:cNvSpPr>
+          <p:nvPr>
+            <p:ph type="sldNum" sz="quarter" idx="12"/>
+          </p:nvPr>
+        </p:nvSpPr>
+        <p:spPr>
+          <a:xfrm>
+            <a:off x="9226550" y="6356350"/>
+            <a:ext cx="2127250" cy="365125"/>
+          </a:xfrm>
+        </p:spPr>
+        <p:txBody>
+          <a:bodyPr/>
+          <a:lstStyle/>
+          <a:p>
+            <a:fld id="{6AF96A2D-3FA1-4888-9206-801C298D91DE}" type="slidenum">
+              <a:rPr lang="en-US" smtClean="0"/>
+              <a:pPr/>
+              <a:t>12</a:t>
             </a:fld>
             <a:endParaRPr lang="en-US" dirty="0"/>
           </a:p>
@@ -4305,7 +4822,7 @@
 </p:sld>
 </file>
 
-<file path=ppt/slides/slide12.xml><?xml version="1.0" encoding="utf-8"?>
+<file path=ppt/slides/slide13.xml><?xml version="1.0" encoding="utf-8"?>
 <p:sld xmlns:a="http://schemas.openxmlformats.org/drawingml/2006/main" xmlns:r="http://schemas.openxmlformats.org/officeDocument/2006/relationships" xmlns:p="http://schemas.openxmlformats.org/presentationml/2006/main">
   <p:cSld>
     <p:spTree>
@@ -5704,19 +6221,31 @@
           <a:p>
             <a:r>
               <a:rPr lang="de-DE" dirty="0" err="1"/>
-              <a:t>Examplary</a:t>
+              <a:t>We</a:t>
             </a:r>
             <a:r>
               <a:rPr lang="de-DE" dirty="0"/>
-              <a:t> Analysis </a:t>
+              <a:t> </a:t>
             </a:r>
             <a:r>
               <a:rPr lang="de-DE" dirty="0" err="1"/>
-              <a:t>of</a:t>
+              <a:t>defined</a:t>
             </a:r>
             <a:r>
               <a:rPr lang="de-DE" dirty="0"/>
-              <a:t> Features in Dataset A</a:t>
+              <a:t> </a:t>
+            </a:r>
+            <a:r>
+              <a:rPr lang="de-DE" dirty="0" err="1"/>
+              <a:t>these</a:t>
+            </a:r>
+            <a:r>
+              <a:rPr lang="de-DE" dirty="0"/>
+              <a:t> </a:t>
+            </a:r>
+            <a:r>
+              <a:rPr lang="de-DE" dirty="0" err="1"/>
+              <a:t>methodes</a:t>
             </a:r>
             <a:r>
               <a:rPr lang="de-DE" sz="2400" noProof="0" dirty="0"/>
@@ -5846,955 +6375,66 @@
           </a:p>
         </p:txBody>
       </p:sp>
-      <p:sp>
-        <p:nvSpPr>
-          <p:cNvPr id="7" name="Textfeld 6">
-            <a:extLst>
-              <a:ext uri="{FF2B5EF4-FFF2-40B4-BE49-F238E27FC236}">
-                <a16:creationId xmlns:a16="http://schemas.microsoft.com/office/drawing/2014/main" id="{294E4BA2-991A-4788-8E84-B992F0B1D52C}"/>
-              </a:ext>
-            </a:extLst>
-          </p:cNvPr>
-          <p:cNvSpPr txBox="1"/>
+      <p:pic>
+        <p:nvPicPr>
+          <p:cNvPr id="10" name="Grafik 9">
+            <a:extLst>
+              <a:ext uri="{FF2B5EF4-FFF2-40B4-BE49-F238E27FC236}">
+                <a16:creationId xmlns:a16="http://schemas.microsoft.com/office/drawing/2014/main" id="{2F9299A1-841A-41E1-8E25-B8A2F05F467C}"/>
+              </a:ext>
+            </a:extLst>
+          </p:cNvPr>
+          <p:cNvPicPr>
+            <a:picLocks noChangeAspect="1"/>
+          </p:cNvPicPr>
           <p:nvPr/>
-        </p:nvSpPr>
-        <p:spPr>
-          <a:xfrm>
-            <a:off x="838200" y="1566828"/>
-            <a:ext cx="6115050" cy="4370748"/>
+        </p:nvPicPr>
+        <p:blipFill>
+          <a:blip r:embed="rId2"/>
+          <a:stretch>
+            <a:fillRect/>
+          </a:stretch>
+        </p:blipFill>
+        <p:spPr>
+          <a:xfrm>
+            <a:off x="990600" y="1839441"/>
+            <a:ext cx="5105400" cy="3905250"/>
           </a:xfrm>
           <a:prstGeom prst="rect">
             <a:avLst/>
           </a:prstGeom>
-          <a:noFill/>
-        </p:spPr>
-        <p:txBody>
-          <a:bodyPr wrap="square">
-            <a:spAutoFit/>
-          </a:bodyPr>
-          <a:lstStyle/>
-          <a:p>
-            <a:pPr>
-              <a:lnSpc>
-                <a:spcPct val="107000"/>
-              </a:lnSpc>
-              <a:spcAft>
-                <a:spcPts val="800"/>
-              </a:spcAft>
-            </a:pPr>
-            <a:r>
-              <a:rPr lang="en-GB" sz="1600" b="1" dirty="0">
-                <a:effectLst/>
-                <a:latin typeface="Calibri" panose="020F0502020204030204" pitchFamily="34" charset="0"/>
-                <a:ea typeface="Times New Roman" panose="02020603050405020304" pitchFamily="18" charset="0"/>
-                <a:cs typeface="Times New Roman" panose="02020603050405020304" pitchFamily="18" charset="0"/>
-              </a:rPr>
-              <a:t>HR [Heart Rate]</a:t>
-            </a:r>
-            <a:endParaRPr lang="de-DE" sz="1600" b="1" dirty="0">
-              <a:effectLst/>
-              <a:latin typeface="Calibri" panose="020F0502020204030204" pitchFamily="34" charset="0"/>
-              <a:ea typeface="Times New Roman" panose="02020603050405020304" pitchFamily="18" charset="0"/>
-              <a:cs typeface="Times New Roman" panose="02020603050405020304" pitchFamily="18" charset="0"/>
-            </a:endParaRPr>
-          </a:p>
-          <a:p>
-            <a:pPr>
-              <a:lnSpc>
-                <a:spcPct val="107000"/>
-              </a:lnSpc>
-              <a:spcAft>
-                <a:spcPts val="800"/>
-              </a:spcAft>
-            </a:pPr>
-            <a:r>
-              <a:rPr lang="en-GB" sz="1600" dirty="0">
-                <a:effectLst/>
-                <a:latin typeface="Calibri" panose="020F0502020204030204" pitchFamily="34" charset="0"/>
-                <a:ea typeface="Times New Roman" panose="02020603050405020304" pitchFamily="18" charset="0"/>
-                <a:cs typeface="Times New Roman" panose="02020603050405020304" pitchFamily="18" charset="0"/>
-              </a:rPr>
-              <a:t>Minimum Value in all HR </a:t>
-            </a:r>
-            <a:r>
-              <a:rPr lang="en-GB" sz="1600" dirty="0" err="1">
-                <a:effectLst/>
-                <a:latin typeface="Calibri" panose="020F0502020204030204" pitchFamily="34" charset="0"/>
-                <a:ea typeface="Times New Roman" panose="02020603050405020304" pitchFamily="18" charset="0"/>
-                <a:cs typeface="Times New Roman" panose="02020603050405020304" pitchFamily="18" charset="0"/>
-              </a:rPr>
-              <a:t>colums</a:t>
-            </a:r>
-            <a:r>
-              <a:rPr lang="en-GB" sz="1600" dirty="0">
-                <a:effectLst/>
-                <a:latin typeface="Calibri" panose="020F0502020204030204" pitchFamily="34" charset="0"/>
-                <a:ea typeface="Times New Roman" panose="02020603050405020304" pitchFamily="18" charset="0"/>
-                <a:cs typeface="Times New Roman" panose="02020603050405020304" pitchFamily="18" charset="0"/>
-              </a:rPr>
-              <a:t>:  ['p004712', 20.0]</a:t>
-            </a:r>
-            <a:endParaRPr lang="de-DE" sz="1600" dirty="0">
-              <a:effectLst/>
-              <a:latin typeface="Calibri" panose="020F0502020204030204" pitchFamily="34" charset="0"/>
-              <a:ea typeface="Times New Roman" panose="02020603050405020304" pitchFamily="18" charset="0"/>
-              <a:cs typeface="Times New Roman" panose="02020603050405020304" pitchFamily="18" charset="0"/>
-            </a:endParaRPr>
-          </a:p>
-          <a:p>
-            <a:pPr>
-              <a:lnSpc>
-                <a:spcPct val="107000"/>
-              </a:lnSpc>
-              <a:spcAft>
-                <a:spcPts val="800"/>
-              </a:spcAft>
-            </a:pPr>
-            <a:r>
-              <a:rPr lang="en-GB" sz="1600" dirty="0">
-                <a:effectLst/>
-                <a:latin typeface="Calibri" panose="020F0502020204030204" pitchFamily="34" charset="0"/>
-                <a:ea typeface="Times New Roman" panose="02020603050405020304" pitchFamily="18" charset="0"/>
-                <a:cs typeface="Times New Roman" panose="02020603050405020304" pitchFamily="18" charset="0"/>
-              </a:rPr>
-              <a:t>Maximum Value in all HR </a:t>
-            </a:r>
-            <a:r>
-              <a:rPr lang="en-GB" sz="1600" dirty="0" err="1">
-                <a:effectLst/>
-                <a:latin typeface="Calibri" panose="020F0502020204030204" pitchFamily="34" charset="0"/>
-                <a:ea typeface="Times New Roman" panose="02020603050405020304" pitchFamily="18" charset="0"/>
-                <a:cs typeface="Times New Roman" panose="02020603050405020304" pitchFamily="18" charset="0"/>
-              </a:rPr>
-              <a:t>colums</a:t>
-            </a:r>
-            <a:r>
-              <a:rPr lang="en-GB" sz="1600" dirty="0">
-                <a:effectLst/>
-                <a:latin typeface="Calibri" panose="020F0502020204030204" pitchFamily="34" charset="0"/>
-                <a:ea typeface="Times New Roman" panose="02020603050405020304" pitchFamily="18" charset="0"/>
-                <a:cs typeface="Times New Roman" panose="02020603050405020304" pitchFamily="18" charset="0"/>
-              </a:rPr>
-              <a:t>:  ['p008574', 280.0]</a:t>
-            </a:r>
-            <a:endParaRPr lang="de-DE" sz="1600" dirty="0">
-              <a:effectLst/>
-              <a:latin typeface="Calibri" panose="020F0502020204030204" pitchFamily="34" charset="0"/>
-              <a:ea typeface="Times New Roman" panose="02020603050405020304" pitchFamily="18" charset="0"/>
-              <a:cs typeface="Times New Roman" panose="02020603050405020304" pitchFamily="18" charset="0"/>
-            </a:endParaRPr>
-          </a:p>
-          <a:p>
-            <a:pPr>
-              <a:lnSpc>
-                <a:spcPct val="107000"/>
-              </a:lnSpc>
-              <a:spcAft>
-                <a:spcPts val="800"/>
-              </a:spcAft>
-            </a:pPr>
-            <a:r>
-              <a:rPr lang="en-GB" sz="1600" dirty="0">
-                <a:effectLst/>
-                <a:latin typeface="Calibri" panose="020F0502020204030204" pitchFamily="34" charset="0"/>
-                <a:ea typeface="Times New Roman" panose="02020603050405020304" pitchFamily="18" charset="0"/>
-                <a:cs typeface="Times New Roman" panose="02020603050405020304" pitchFamily="18" charset="0"/>
-              </a:rPr>
-              <a:t>Average Value in all HR </a:t>
-            </a:r>
-            <a:r>
-              <a:rPr lang="en-GB" sz="1600" dirty="0" err="1">
-                <a:effectLst/>
-                <a:latin typeface="Calibri" panose="020F0502020204030204" pitchFamily="34" charset="0"/>
-                <a:ea typeface="Times New Roman" panose="02020603050405020304" pitchFamily="18" charset="0"/>
-                <a:cs typeface="Times New Roman" panose="02020603050405020304" pitchFamily="18" charset="0"/>
-              </a:rPr>
-              <a:t>colums</a:t>
-            </a:r>
-            <a:r>
-              <a:rPr lang="en-GB" sz="1600" dirty="0">
-                <a:effectLst/>
-                <a:latin typeface="Calibri" panose="020F0502020204030204" pitchFamily="34" charset="0"/>
-                <a:ea typeface="Times New Roman" panose="02020603050405020304" pitchFamily="18" charset="0"/>
-                <a:cs typeface="Times New Roman" panose="02020603050405020304" pitchFamily="18" charset="0"/>
-              </a:rPr>
-              <a:t>:  84.98526444873023</a:t>
-            </a:r>
-            <a:endParaRPr lang="de-DE" sz="1600" dirty="0">
-              <a:effectLst/>
-              <a:latin typeface="Calibri" panose="020F0502020204030204" pitchFamily="34" charset="0"/>
-              <a:ea typeface="Times New Roman" panose="02020603050405020304" pitchFamily="18" charset="0"/>
-              <a:cs typeface="Times New Roman" panose="02020603050405020304" pitchFamily="18" charset="0"/>
-            </a:endParaRPr>
-          </a:p>
-          <a:p>
-            <a:pPr>
-              <a:lnSpc>
-                <a:spcPct val="107000"/>
-              </a:lnSpc>
-              <a:spcAft>
-                <a:spcPts val="800"/>
-              </a:spcAft>
-            </a:pPr>
-            <a:r>
-              <a:rPr lang="en-GB" sz="1600" dirty="0">
-                <a:effectLst/>
-                <a:latin typeface="Calibri" panose="020F0502020204030204" pitchFamily="34" charset="0"/>
-                <a:ea typeface="Times New Roman" panose="02020603050405020304" pitchFamily="18" charset="0"/>
-                <a:cs typeface="Times New Roman" panose="02020603050405020304" pitchFamily="18" charset="0"/>
-              </a:rPr>
-              <a:t>Missing Values in all HR </a:t>
-            </a:r>
-            <a:r>
-              <a:rPr lang="en-GB" sz="1600" dirty="0" err="1">
-                <a:effectLst/>
-                <a:latin typeface="Calibri" panose="020F0502020204030204" pitchFamily="34" charset="0"/>
-                <a:ea typeface="Times New Roman" panose="02020603050405020304" pitchFamily="18" charset="0"/>
-                <a:cs typeface="Times New Roman" panose="02020603050405020304" pitchFamily="18" charset="0"/>
-              </a:rPr>
-              <a:t>colums</a:t>
-            </a:r>
-            <a:r>
-              <a:rPr lang="en-GB" sz="1600" dirty="0">
-                <a:effectLst/>
-                <a:latin typeface="Calibri" panose="020F0502020204030204" pitchFamily="34" charset="0"/>
-                <a:ea typeface="Times New Roman" panose="02020603050405020304" pitchFamily="18" charset="0"/>
-                <a:cs typeface="Times New Roman" panose="02020603050405020304" pitchFamily="18" charset="0"/>
-              </a:rPr>
-              <a:t>:  61189</a:t>
-            </a:r>
-            <a:endParaRPr lang="de-DE" sz="1600" dirty="0">
-              <a:effectLst/>
-              <a:latin typeface="Calibri" panose="020F0502020204030204" pitchFamily="34" charset="0"/>
-              <a:ea typeface="Times New Roman" panose="02020603050405020304" pitchFamily="18" charset="0"/>
-              <a:cs typeface="Times New Roman" panose="02020603050405020304" pitchFamily="18" charset="0"/>
-            </a:endParaRPr>
-          </a:p>
-          <a:p>
-            <a:pPr>
-              <a:lnSpc>
-                <a:spcPct val="107000"/>
-              </a:lnSpc>
-              <a:spcAft>
-                <a:spcPts val="800"/>
-              </a:spcAft>
-            </a:pPr>
-            <a:r>
-              <a:rPr lang="en-GB" sz="1600" dirty="0">
-                <a:effectLst/>
-                <a:latin typeface="Calibri" panose="020F0502020204030204" pitchFamily="34" charset="0"/>
-                <a:ea typeface="Times New Roman" panose="02020603050405020304" pitchFamily="18" charset="0"/>
-                <a:cs typeface="Times New Roman" panose="02020603050405020304" pitchFamily="18" charset="0"/>
-              </a:rPr>
-              <a:t> </a:t>
-            </a:r>
-            <a:endParaRPr lang="de-DE" sz="1600" dirty="0">
-              <a:effectLst/>
-              <a:latin typeface="Calibri" panose="020F0502020204030204" pitchFamily="34" charset="0"/>
-              <a:ea typeface="Times New Roman" panose="02020603050405020304" pitchFamily="18" charset="0"/>
-              <a:cs typeface="Times New Roman" panose="02020603050405020304" pitchFamily="18" charset="0"/>
-            </a:endParaRPr>
-          </a:p>
-          <a:p>
-            <a:pPr>
-              <a:lnSpc>
-                <a:spcPct val="107000"/>
-              </a:lnSpc>
-              <a:spcAft>
-                <a:spcPts val="800"/>
-              </a:spcAft>
-            </a:pPr>
-            <a:r>
-              <a:rPr lang="en-GB" sz="1600" b="1" dirty="0">
-                <a:effectLst/>
-                <a:latin typeface="Calibri" panose="020F0502020204030204" pitchFamily="34" charset="0"/>
-                <a:ea typeface="Times New Roman" panose="02020603050405020304" pitchFamily="18" charset="0"/>
-                <a:cs typeface="Times New Roman" panose="02020603050405020304" pitchFamily="18" charset="0"/>
-              </a:rPr>
-              <a:t>O2Sat [O2 Saturation]</a:t>
-            </a:r>
-            <a:endParaRPr lang="de-DE" sz="1600" b="1" dirty="0">
-              <a:effectLst/>
-              <a:latin typeface="Calibri" panose="020F0502020204030204" pitchFamily="34" charset="0"/>
-              <a:ea typeface="Times New Roman" panose="02020603050405020304" pitchFamily="18" charset="0"/>
-              <a:cs typeface="Times New Roman" panose="02020603050405020304" pitchFamily="18" charset="0"/>
-            </a:endParaRPr>
-          </a:p>
-          <a:p>
-            <a:pPr>
-              <a:lnSpc>
-                <a:spcPct val="107000"/>
-              </a:lnSpc>
-              <a:spcAft>
-                <a:spcPts val="800"/>
-              </a:spcAft>
-            </a:pPr>
-            <a:r>
-              <a:rPr lang="en-GB" sz="1600" dirty="0">
-                <a:effectLst/>
-                <a:latin typeface="Calibri" panose="020F0502020204030204" pitchFamily="34" charset="0"/>
-                <a:ea typeface="Times New Roman" panose="02020603050405020304" pitchFamily="18" charset="0"/>
-                <a:cs typeface="Times New Roman" panose="02020603050405020304" pitchFamily="18" charset="0"/>
-              </a:rPr>
-              <a:t>Minimum Value in all O2Sat </a:t>
-            </a:r>
-            <a:r>
-              <a:rPr lang="en-GB" sz="1600" dirty="0" err="1">
-                <a:effectLst/>
-                <a:latin typeface="Calibri" panose="020F0502020204030204" pitchFamily="34" charset="0"/>
-                <a:ea typeface="Times New Roman" panose="02020603050405020304" pitchFamily="18" charset="0"/>
-                <a:cs typeface="Times New Roman" panose="02020603050405020304" pitchFamily="18" charset="0"/>
-              </a:rPr>
-              <a:t>colums</a:t>
-            </a:r>
-            <a:r>
-              <a:rPr lang="en-GB" sz="1600" dirty="0">
-                <a:effectLst/>
-                <a:latin typeface="Calibri" panose="020F0502020204030204" pitchFamily="34" charset="0"/>
-                <a:ea typeface="Times New Roman" panose="02020603050405020304" pitchFamily="18" charset="0"/>
-                <a:cs typeface="Times New Roman" panose="02020603050405020304" pitchFamily="18" charset="0"/>
-              </a:rPr>
-              <a:t>:  ['p014401', 20.0]</a:t>
-            </a:r>
-            <a:endParaRPr lang="de-DE" sz="1600" dirty="0">
-              <a:effectLst/>
-              <a:latin typeface="Calibri" panose="020F0502020204030204" pitchFamily="34" charset="0"/>
-              <a:ea typeface="Times New Roman" panose="02020603050405020304" pitchFamily="18" charset="0"/>
-              <a:cs typeface="Times New Roman" panose="02020603050405020304" pitchFamily="18" charset="0"/>
-            </a:endParaRPr>
-          </a:p>
-          <a:p>
-            <a:pPr>
-              <a:lnSpc>
-                <a:spcPct val="107000"/>
-              </a:lnSpc>
-              <a:spcAft>
-                <a:spcPts val="800"/>
-              </a:spcAft>
-            </a:pPr>
-            <a:r>
-              <a:rPr lang="en-GB" sz="1600" dirty="0">
-                <a:effectLst/>
-                <a:latin typeface="Calibri" panose="020F0502020204030204" pitchFamily="34" charset="0"/>
-                <a:ea typeface="Times New Roman" panose="02020603050405020304" pitchFamily="18" charset="0"/>
-                <a:cs typeface="Times New Roman" panose="02020603050405020304" pitchFamily="18" charset="0"/>
-              </a:rPr>
-              <a:t>Maximum Value in all O2Sat </a:t>
-            </a:r>
-            <a:r>
-              <a:rPr lang="en-GB" sz="1600" dirty="0" err="1">
-                <a:effectLst/>
-                <a:latin typeface="Calibri" panose="020F0502020204030204" pitchFamily="34" charset="0"/>
-                <a:ea typeface="Times New Roman" panose="02020603050405020304" pitchFamily="18" charset="0"/>
-                <a:cs typeface="Times New Roman" panose="02020603050405020304" pitchFamily="18" charset="0"/>
-              </a:rPr>
-              <a:t>colums</a:t>
-            </a:r>
-            <a:r>
-              <a:rPr lang="en-GB" sz="1600" dirty="0">
-                <a:effectLst/>
-                <a:latin typeface="Calibri" panose="020F0502020204030204" pitchFamily="34" charset="0"/>
-                <a:ea typeface="Times New Roman" panose="02020603050405020304" pitchFamily="18" charset="0"/>
-                <a:cs typeface="Times New Roman" panose="02020603050405020304" pitchFamily="18" charset="0"/>
-              </a:rPr>
-              <a:t>:  ['p000001', 100.0]</a:t>
-            </a:r>
-            <a:endParaRPr lang="de-DE" sz="1600" dirty="0">
-              <a:effectLst/>
-              <a:latin typeface="Calibri" panose="020F0502020204030204" pitchFamily="34" charset="0"/>
-              <a:ea typeface="Times New Roman" panose="02020603050405020304" pitchFamily="18" charset="0"/>
-              <a:cs typeface="Times New Roman" panose="02020603050405020304" pitchFamily="18" charset="0"/>
-            </a:endParaRPr>
-          </a:p>
-          <a:p>
-            <a:pPr>
-              <a:lnSpc>
-                <a:spcPct val="107000"/>
-              </a:lnSpc>
-              <a:spcAft>
-                <a:spcPts val="800"/>
-              </a:spcAft>
-            </a:pPr>
-            <a:r>
-              <a:rPr lang="en-GB" sz="1600" dirty="0">
-                <a:effectLst/>
-                <a:latin typeface="Calibri" panose="020F0502020204030204" pitchFamily="34" charset="0"/>
-                <a:ea typeface="Times New Roman" panose="02020603050405020304" pitchFamily="18" charset="0"/>
-                <a:cs typeface="Times New Roman" panose="02020603050405020304" pitchFamily="18" charset="0"/>
-              </a:rPr>
-              <a:t>Average Value in all O2Sat </a:t>
-            </a:r>
-            <a:r>
-              <a:rPr lang="en-GB" sz="1600" dirty="0" err="1">
-                <a:effectLst/>
-                <a:latin typeface="Calibri" panose="020F0502020204030204" pitchFamily="34" charset="0"/>
-                <a:ea typeface="Times New Roman" panose="02020603050405020304" pitchFamily="18" charset="0"/>
-                <a:cs typeface="Times New Roman" panose="02020603050405020304" pitchFamily="18" charset="0"/>
-              </a:rPr>
-              <a:t>colums</a:t>
-            </a:r>
-            <a:r>
-              <a:rPr lang="en-GB" sz="1600" dirty="0">
-                <a:effectLst/>
-                <a:latin typeface="Calibri" panose="020F0502020204030204" pitchFamily="34" charset="0"/>
-                <a:ea typeface="Times New Roman" panose="02020603050405020304" pitchFamily="18" charset="0"/>
-                <a:cs typeface="Times New Roman" panose="02020603050405020304" pitchFamily="18" charset="0"/>
-              </a:rPr>
-              <a:t>:  97.26568772153938</a:t>
-            </a:r>
-            <a:endParaRPr lang="de-DE" sz="1600" dirty="0">
-              <a:effectLst/>
-              <a:latin typeface="Calibri" panose="020F0502020204030204" pitchFamily="34" charset="0"/>
-              <a:ea typeface="Times New Roman" panose="02020603050405020304" pitchFamily="18" charset="0"/>
-              <a:cs typeface="Times New Roman" panose="02020603050405020304" pitchFamily="18" charset="0"/>
-            </a:endParaRPr>
-          </a:p>
-          <a:p>
-            <a:pPr>
-              <a:lnSpc>
-                <a:spcPct val="107000"/>
-              </a:lnSpc>
-              <a:spcAft>
-                <a:spcPts val="800"/>
-              </a:spcAft>
-            </a:pPr>
-            <a:r>
-              <a:rPr lang="en-GB" sz="1600" dirty="0">
-                <a:effectLst/>
-                <a:latin typeface="Calibri" panose="020F0502020204030204" pitchFamily="34" charset="0"/>
-                <a:ea typeface="Times New Roman" panose="02020603050405020304" pitchFamily="18" charset="0"/>
-                <a:cs typeface="Times New Roman" panose="02020603050405020304" pitchFamily="18" charset="0"/>
-              </a:rPr>
-              <a:t>Missing Values in all O2Sat </a:t>
-            </a:r>
-            <a:r>
-              <a:rPr lang="en-GB" sz="1600" dirty="0" err="1">
-                <a:effectLst/>
-                <a:latin typeface="Calibri" panose="020F0502020204030204" pitchFamily="34" charset="0"/>
-                <a:ea typeface="Times New Roman" panose="02020603050405020304" pitchFamily="18" charset="0"/>
-                <a:cs typeface="Times New Roman" panose="02020603050405020304" pitchFamily="18" charset="0"/>
-              </a:rPr>
-              <a:t>colums</a:t>
-            </a:r>
-            <a:r>
-              <a:rPr lang="en-GB" sz="1600" dirty="0">
-                <a:effectLst/>
-                <a:latin typeface="Calibri" panose="020F0502020204030204" pitchFamily="34" charset="0"/>
-                <a:ea typeface="Times New Roman" panose="02020603050405020304" pitchFamily="18" charset="0"/>
-                <a:cs typeface="Times New Roman" panose="02020603050405020304" pitchFamily="18" charset="0"/>
-              </a:rPr>
-              <a:t>:  95079</a:t>
-            </a:r>
-            <a:endParaRPr lang="de-DE" sz="1600" dirty="0">
-              <a:effectLst/>
-              <a:latin typeface="Calibri" panose="020F0502020204030204" pitchFamily="34" charset="0"/>
-              <a:ea typeface="Times New Roman" panose="02020603050405020304" pitchFamily="18" charset="0"/>
-              <a:cs typeface="Times New Roman" panose="02020603050405020304" pitchFamily="18" charset="0"/>
-            </a:endParaRPr>
-          </a:p>
-          <a:p>
-            <a:pPr>
-              <a:lnSpc>
-                <a:spcPct val="107000"/>
-              </a:lnSpc>
-              <a:spcAft>
-                <a:spcPts val="800"/>
-              </a:spcAft>
-            </a:pPr>
-            <a:r>
-              <a:rPr lang="en-GB" sz="1600" dirty="0">
-                <a:effectLst/>
-                <a:latin typeface="Calibri" panose="020F0502020204030204" pitchFamily="34" charset="0"/>
-                <a:ea typeface="Times New Roman" panose="02020603050405020304" pitchFamily="18" charset="0"/>
-                <a:cs typeface="Times New Roman" panose="02020603050405020304" pitchFamily="18" charset="0"/>
-              </a:rPr>
-              <a:t> </a:t>
-            </a:r>
-            <a:endParaRPr lang="de-DE" sz="1600" dirty="0">
-              <a:effectLst/>
-              <a:latin typeface="Calibri" panose="020F0502020204030204" pitchFamily="34" charset="0"/>
-              <a:ea typeface="Times New Roman" panose="02020603050405020304" pitchFamily="18" charset="0"/>
-              <a:cs typeface="Times New Roman" panose="02020603050405020304" pitchFamily="18" charset="0"/>
-            </a:endParaRPr>
-          </a:p>
-        </p:txBody>
-      </p:sp>
-      <p:sp>
-        <p:nvSpPr>
-          <p:cNvPr id="8" name="Textfeld 7">
-            <a:extLst>
-              <a:ext uri="{FF2B5EF4-FFF2-40B4-BE49-F238E27FC236}">
-                <a16:creationId xmlns:a16="http://schemas.microsoft.com/office/drawing/2014/main" id="{45538D4C-8124-4BFD-B852-82C65565DA30}"/>
-              </a:ext>
-            </a:extLst>
-          </p:cNvPr>
-          <p:cNvSpPr txBox="1"/>
+        </p:spPr>
+      </p:pic>
+      <p:pic>
+        <p:nvPicPr>
+          <p:cNvPr id="12" name="Grafik 11">
+            <a:extLst>
+              <a:ext uri="{FF2B5EF4-FFF2-40B4-BE49-F238E27FC236}">
+                <a16:creationId xmlns:a16="http://schemas.microsoft.com/office/drawing/2014/main" id="{F2D3AD2A-DE02-4E2B-A763-84C8E8174596}"/>
+              </a:ext>
+            </a:extLst>
+          </p:cNvPr>
+          <p:cNvPicPr>
+            <a:picLocks noChangeAspect="1"/>
+          </p:cNvPicPr>
           <p:nvPr/>
-        </p:nvSpPr>
-        <p:spPr>
-          <a:xfrm>
-            <a:off x="6178550" y="1566828"/>
-            <a:ext cx="6096000" cy="5069914"/>
+        </p:nvPicPr>
+        <p:blipFill>
+          <a:blip r:embed="rId3"/>
+          <a:stretch>
+            <a:fillRect/>
+          </a:stretch>
+        </p:blipFill>
+        <p:spPr>
+          <a:xfrm>
+            <a:off x="6096000" y="1839441"/>
+            <a:ext cx="4838700" cy="3276600"/>
           </a:xfrm>
           <a:prstGeom prst="rect">
             <a:avLst/>
           </a:prstGeom>
-          <a:noFill/>
-        </p:spPr>
-        <p:txBody>
-          <a:bodyPr wrap="square">
-            <a:spAutoFit/>
-          </a:bodyPr>
-          <a:lstStyle/>
-          <a:p>
-            <a:pPr>
-              <a:lnSpc>
-                <a:spcPct val="107000"/>
-              </a:lnSpc>
-              <a:spcAft>
-                <a:spcPts val="800"/>
-              </a:spcAft>
-            </a:pPr>
-            <a:r>
-              <a:rPr lang="en-GB" sz="1600" b="1" dirty="0">
-                <a:effectLst/>
-                <a:latin typeface="Calibri" panose="020F0502020204030204" pitchFamily="34" charset="0"/>
-                <a:ea typeface="Times New Roman" panose="02020603050405020304" pitchFamily="18" charset="0"/>
-                <a:cs typeface="Times New Roman" panose="02020603050405020304" pitchFamily="18" charset="0"/>
-              </a:rPr>
-              <a:t>Temp [Temperature]</a:t>
-            </a:r>
-            <a:endParaRPr lang="de-DE" sz="1600" b="1" dirty="0">
-              <a:effectLst/>
-              <a:latin typeface="Calibri" panose="020F0502020204030204" pitchFamily="34" charset="0"/>
-              <a:ea typeface="Times New Roman" panose="02020603050405020304" pitchFamily="18" charset="0"/>
-              <a:cs typeface="Times New Roman" panose="02020603050405020304" pitchFamily="18" charset="0"/>
-            </a:endParaRPr>
-          </a:p>
-          <a:p>
-            <a:pPr>
-              <a:lnSpc>
-                <a:spcPct val="107000"/>
-              </a:lnSpc>
-              <a:spcAft>
-                <a:spcPts val="800"/>
-              </a:spcAft>
-            </a:pPr>
-            <a:r>
-              <a:rPr lang="en-GB" sz="1600" dirty="0">
-                <a:effectLst/>
-                <a:latin typeface="Calibri" panose="020F0502020204030204" pitchFamily="34" charset="0"/>
-                <a:ea typeface="Times New Roman" panose="02020603050405020304" pitchFamily="18" charset="0"/>
-                <a:cs typeface="Times New Roman" panose="02020603050405020304" pitchFamily="18" charset="0"/>
-              </a:rPr>
-              <a:t>Minimum Value in all Temp </a:t>
-            </a:r>
-            <a:r>
-              <a:rPr lang="en-GB" sz="1600" dirty="0" err="1">
-                <a:effectLst/>
-                <a:latin typeface="Calibri" panose="020F0502020204030204" pitchFamily="34" charset="0"/>
-                <a:ea typeface="Times New Roman" panose="02020603050405020304" pitchFamily="18" charset="0"/>
-                <a:cs typeface="Times New Roman" panose="02020603050405020304" pitchFamily="18" charset="0"/>
-              </a:rPr>
-              <a:t>colums</a:t>
-            </a:r>
-            <a:r>
-              <a:rPr lang="en-GB" sz="1600" dirty="0">
-                <a:effectLst/>
-                <a:latin typeface="Calibri" panose="020F0502020204030204" pitchFamily="34" charset="0"/>
-                <a:ea typeface="Times New Roman" panose="02020603050405020304" pitchFamily="18" charset="0"/>
-                <a:cs typeface="Times New Roman" panose="02020603050405020304" pitchFamily="18" charset="0"/>
-              </a:rPr>
-              <a:t>:  ['p002421', 20.9]</a:t>
-            </a:r>
-            <a:endParaRPr lang="de-DE" sz="1600" dirty="0">
-              <a:effectLst/>
-              <a:latin typeface="Calibri" panose="020F0502020204030204" pitchFamily="34" charset="0"/>
-              <a:ea typeface="Times New Roman" panose="02020603050405020304" pitchFamily="18" charset="0"/>
-              <a:cs typeface="Times New Roman" panose="02020603050405020304" pitchFamily="18" charset="0"/>
-            </a:endParaRPr>
-          </a:p>
-          <a:p>
-            <a:pPr>
-              <a:lnSpc>
-                <a:spcPct val="107000"/>
-              </a:lnSpc>
-              <a:spcAft>
-                <a:spcPts val="800"/>
-              </a:spcAft>
-            </a:pPr>
-            <a:r>
-              <a:rPr lang="en-GB" sz="1600" dirty="0">
-                <a:effectLst/>
-                <a:latin typeface="Calibri" panose="020F0502020204030204" pitchFamily="34" charset="0"/>
-                <a:ea typeface="Times New Roman" panose="02020603050405020304" pitchFamily="18" charset="0"/>
-                <a:cs typeface="Times New Roman" panose="02020603050405020304" pitchFamily="18" charset="0"/>
-              </a:rPr>
-              <a:t>Maximum Value in all Temp </a:t>
-            </a:r>
-            <a:r>
-              <a:rPr lang="en-GB" sz="1600" dirty="0" err="1">
-                <a:effectLst/>
-                <a:latin typeface="Calibri" panose="020F0502020204030204" pitchFamily="34" charset="0"/>
-                <a:ea typeface="Times New Roman" panose="02020603050405020304" pitchFamily="18" charset="0"/>
-                <a:cs typeface="Times New Roman" panose="02020603050405020304" pitchFamily="18" charset="0"/>
-              </a:rPr>
-              <a:t>colums</a:t>
-            </a:r>
-            <a:r>
-              <a:rPr lang="en-GB" sz="1600" dirty="0">
-                <a:effectLst/>
-                <a:latin typeface="Calibri" panose="020F0502020204030204" pitchFamily="34" charset="0"/>
-                <a:ea typeface="Times New Roman" panose="02020603050405020304" pitchFamily="18" charset="0"/>
-                <a:cs typeface="Times New Roman" panose="02020603050405020304" pitchFamily="18" charset="0"/>
-              </a:rPr>
-              <a:t>:  ['p015104', 42.22]</a:t>
-            </a:r>
-            <a:endParaRPr lang="de-DE" sz="1600" dirty="0">
-              <a:effectLst/>
-              <a:latin typeface="Calibri" panose="020F0502020204030204" pitchFamily="34" charset="0"/>
-              <a:ea typeface="Times New Roman" panose="02020603050405020304" pitchFamily="18" charset="0"/>
-              <a:cs typeface="Times New Roman" panose="02020603050405020304" pitchFamily="18" charset="0"/>
-            </a:endParaRPr>
-          </a:p>
-          <a:p>
-            <a:pPr>
-              <a:lnSpc>
-                <a:spcPct val="107000"/>
-              </a:lnSpc>
-              <a:spcAft>
-                <a:spcPts val="800"/>
-              </a:spcAft>
-            </a:pPr>
-            <a:r>
-              <a:rPr lang="en-GB" sz="1600" dirty="0">
-                <a:effectLst/>
-                <a:latin typeface="Calibri" panose="020F0502020204030204" pitchFamily="34" charset="0"/>
-                <a:ea typeface="Times New Roman" panose="02020603050405020304" pitchFamily="18" charset="0"/>
-                <a:cs typeface="Times New Roman" panose="02020603050405020304" pitchFamily="18" charset="0"/>
-              </a:rPr>
-              <a:t>Average Value in all Temp </a:t>
-            </a:r>
-            <a:r>
-              <a:rPr lang="en-GB" sz="1600" dirty="0" err="1">
-                <a:effectLst/>
-                <a:latin typeface="Calibri" panose="020F0502020204030204" pitchFamily="34" charset="0"/>
-                <a:ea typeface="Times New Roman" panose="02020603050405020304" pitchFamily="18" charset="0"/>
-                <a:cs typeface="Times New Roman" panose="02020603050405020304" pitchFamily="18" charset="0"/>
-              </a:rPr>
-              <a:t>colums</a:t>
-            </a:r>
-            <a:r>
-              <a:rPr lang="en-GB" sz="1600" dirty="0">
-                <a:effectLst/>
-                <a:latin typeface="Calibri" panose="020F0502020204030204" pitchFamily="34" charset="0"/>
-                <a:ea typeface="Times New Roman" panose="02020603050405020304" pitchFamily="18" charset="0"/>
-                <a:cs typeface="Times New Roman" panose="02020603050405020304" pitchFamily="18" charset="0"/>
-              </a:rPr>
-              <a:t>:  37.02673699236573</a:t>
-            </a:r>
-            <a:endParaRPr lang="de-DE" sz="1600" dirty="0">
-              <a:effectLst/>
-              <a:latin typeface="Calibri" panose="020F0502020204030204" pitchFamily="34" charset="0"/>
-              <a:ea typeface="Times New Roman" panose="02020603050405020304" pitchFamily="18" charset="0"/>
-              <a:cs typeface="Times New Roman" panose="02020603050405020304" pitchFamily="18" charset="0"/>
-            </a:endParaRPr>
-          </a:p>
-          <a:p>
-            <a:pPr>
-              <a:lnSpc>
-                <a:spcPct val="107000"/>
-              </a:lnSpc>
-              <a:spcAft>
-                <a:spcPts val="800"/>
-              </a:spcAft>
-            </a:pPr>
-            <a:r>
-              <a:rPr lang="en-GB" sz="1600" dirty="0">
-                <a:effectLst/>
-                <a:latin typeface="Calibri" panose="020F0502020204030204" pitchFamily="34" charset="0"/>
-                <a:ea typeface="Times New Roman" panose="02020603050405020304" pitchFamily="18" charset="0"/>
-                <a:cs typeface="Times New Roman" panose="02020603050405020304" pitchFamily="18" charset="0"/>
-              </a:rPr>
-              <a:t>Missing Values in all Temp </a:t>
-            </a:r>
-            <a:r>
-              <a:rPr lang="en-GB" sz="1600" dirty="0" err="1">
-                <a:effectLst/>
-                <a:latin typeface="Calibri" panose="020F0502020204030204" pitchFamily="34" charset="0"/>
-                <a:ea typeface="Times New Roman" panose="02020603050405020304" pitchFamily="18" charset="0"/>
-                <a:cs typeface="Times New Roman" panose="02020603050405020304" pitchFamily="18" charset="0"/>
-              </a:rPr>
-              <a:t>colums</a:t>
-            </a:r>
-            <a:r>
-              <a:rPr lang="en-GB" sz="1600" dirty="0">
-                <a:effectLst/>
-                <a:latin typeface="Calibri" panose="020F0502020204030204" pitchFamily="34" charset="0"/>
-                <a:ea typeface="Times New Roman" panose="02020603050405020304" pitchFamily="18" charset="0"/>
-                <a:cs typeface="Times New Roman" panose="02020603050405020304" pitchFamily="18" charset="0"/>
-              </a:rPr>
-              <a:t>:  523314  </a:t>
-            </a:r>
-          </a:p>
-          <a:p>
-            <a:pPr>
-              <a:lnSpc>
-                <a:spcPct val="107000"/>
-              </a:lnSpc>
-              <a:spcAft>
-                <a:spcPts val="800"/>
-              </a:spcAft>
-            </a:pPr>
-            <a:endParaRPr lang="en-GB" sz="1400" dirty="0">
-              <a:latin typeface="Calibri" panose="020F0502020204030204" pitchFamily="34" charset="0"/>
-              <a:cs typeface="Times New Roman" panose="02020603050405020304" pitchFamily="18" charset="0"/>
-            </a:endParaRPr>
-          </a:p>
-          <a:p>
-            <a:pPr>
-              <a:lnSpc>
-                <a:spcPct val="107000"/>
-              </a:lnSpc>
-              <a:spcAft>
-                <a:spcPts val="800"/>
-              </a:spcAft>
-            </a:pPr>
-            <a:r>
-              <a:rPr lang="en-GB" sz="1600" b="1" dirty="0">
-                <a:effectLst/>
-                <a:latin typeface="Calibri" panose="020F0502020204030204" pitchFamily="34" charset="0"/>
-                <a:ea typeface="Times New Roman" panose="02020603050405020304" pitchFamily="18" charset="0"/>
-                <a:cs typeface="Times New Roman" panose="02020603050405020304" pitchFamily="18" charset="0"/>
-              </a:rPr>
-              <a:t>SBP [Systolic BP]</a:t>
-            </a:r>
-            <a:endParaRPr lang="de-DE" sz="1600" b="1" dirty="0">
-              <a:effectLst/>
-              <a:latin typeface="Calibri" panose="020F0502020204030204" pitchFamily="34" charset="0"/>
-              <a:ea typeface="Times New Roman" panose="02020603050405020304" pitchFamily="18" charset="0"/>
-              <a:cs typeface="Times New Roman" panose="02020603050405020304" pitchFamily="18" charset="0"/>
-            </a:endParaRPr>
-          </a:p>
-          <a:p>
-            <a:pPr>
-              <a:lnSpc>
-                <a:spcPct val="107000"/>
-              </a:lnSpc>
-              <a:spcAft>
-                <a:spcPts val="800"/>
-              </a:spcAft>
-            </a:pPr>
-            <a:r>
-              <a:rPr lang="en-GB" sz="1600" dirty="0">
-                <a:effectLst/>
-                <a:latin typeface="Calibri" panose="020F0502020204030204" pitchFamily="34" charset="0"/>
-                <a:ea typeface="Times New Roman" panose="02020603050405020304" pitchFamily="18" charset="0"/>
-                <a:cs typeface="Times New Roman" panose="02020603050405020304" pitchFamily="18" charset="0"/>
-              </a:rPr>
-              <a:t>Minimum Value in all SBP </a:t>
-            </a:r>
-            <a:r>
-              <a:rPr lang="en-GB" sz="1600" dirty="0" err="1">
-                <a:effectLst/>
-                <a:latin typeface="Calibri" panose="020F0502020204030204" pitchFamily="34" charset="0"/>
-                <a:ea typeface="Times New Roman" panose="02020603050405020304" pitchFamily="18" charset="0"/>
-                <a:cs typeface="Times New Roman" panose="02020603050405020304" pitchFamily="18" charset="0"/>
-              </a:rPr>
-              <a:t>colums</a:t>
-            </a:r>
-            <a:r>
-              <a:rPr lang="en-GB" sz="1600" dirty="0">
-                <a:effectLst/>
-                <a:latin typeface="Calibri" panose="020F0502020204030204" pitchFamily="34" charset="0"/>
-                <a:ea typeface="Times New Roman" panose="02020603050405020304" pitchFamily="18" charset="0"/>
-                <a:cs typeface="Times New Roman" panose="02020603050405020304" pitchFamily="18" charset="0"/>
-              </a:rPr>
-              <a:t>:  ['p014968', 22.0]</a:t>
-            </a:r>
-            <a:endParaRPr lang="de-DE" sz="1600" dirty="0">
-              <a:effectLst/>
-              <a:latin typeface="Calibri" panose="020F0502020204030204" pitchFamily="34" charset="0"/>
-              <a:ea typeface="Times New Roman" panose="02020603050405020304" pitchFamily="18" charset="0"/>
-              <a:cs typeface="Times New Roman" panose="02020603050405020304" pitchFamily="18" charset="0"/>
-            </a:endParaRPr>
-          </a:p>
-          <a:p>
-            <a:pPr>
-              <a:lnSpc>
-                <a:spcPct val="107000"/>
-              </a:lnSpc>
-              <a:spcAft>
-                <a:spcPts val="800"/>
-              </a:spcAft>
-            </a:pPr>
-            <a:r>
-              <a:rPr lang="en-GB" sz="1600" dirty="0">
-                <a:effectLst/>
-                <a:latin typeface="Calibri" panose="020F0502020204030204" pitchFamily="34" charset="0"/>
-                <a:ea typeface="Times New Roman" panose="02020603050405020304" pitchFamily="18" charset="0"/>
-                <a:cs typeface="Times New Roman" panose="02020603050405020304" pitchFamily="18" charset="0"/>
-              </a:rPr>
-              <a:t>Maximum Value in all SBP </a:t>
-            </a:r>
-            <a:r>
-              <a:rPr lang="en-GB" sz="1600" dirty="0" err="1">
-                <a:effectLst/>
-                <a:latin typeface="Calibri" panose="020F0502020204030204" pitchFamily="34" charset="0"/>
-                <a:ea typeface="Times New Roman" panose="02020603050405020304" pitchFamily="18" charset="0"/>
-                <a:cs typeface="Times New Roman" panose="02020603050405020304" pitchFamily="18" charset="0"/>
-              </a:rPr>
-              <a:t>colums</a:t>
-            </a:r>
-            <a:r>
-              <a:rPr lang="en-GB" sz="1600" dirty="0">
-                <a:effectLst/>
-                <a:latin typeface="Calibri" panose="020F0502020204030204" pitchFamily="34" charset="0"/>
-                <a:ea typeface="Times New Roman" panose="02020603050405020304" pitchFamily="18" charset="0"/>
-                <a:cs typeface="Times New Roman" panose="02020603050405020304" pitchFamily="18" charset="0"/>
-              </a:rPr>
-              <a:t>:  ['p005749', 281.0]</a:t>
-            </a:r>
-            <a:endParaRPr lang="de-DE" sz="1600" dirty="0">
-              <a:effectLst/>
-              <a:latin typeface="Calibri" panose="020F0502020204030204" pitchFamily="34" charset="0"/>
-              <a:ea typeface="Times New Roman" panose="02020603050405020304" pitchFamily="18" charset="0"/>
-              <a:cs typeface="Times New Roman" panose="02020603050405020304" pitchFamily="18" charset="0"/>
-            </a:endParaRPr>
-          </a:p>
-          <a:p>
-            <a:pPr>
-              <a:lnSpc>
-                <a:spcPct val="107000"/>
-              </a:lnSpc>
-              <a:spcAft>
-                <a:spcPts val="800"/>
-              </a:spcAft>
-            </a:pPr>
-            <a:r>
-              <a:rPr lang="en-GB" sz="1600" dirty="0">
-                <a:effectLst/>
-                <a:latin typeface="Calibri" panose="020F0502020204030204" pitchFamily="34" charset="0"/>
-                <a:ea typeface="Times New Roman" panose="02020603050405020304" pitchFamily="18" charset="0"/>
-                <a:cs typeface="Times New Roman" panose="02020603050405020304" pitchFamily="18" charset="0"/>
-              </a:rPr>
-              <a:t>Average Value in all SBP </a:t>
-            </a:r>
-            <a:r>
-              <a:rPr lang="en-GB" sz="1600" dirty="0" err="1">
-                <a:effectLst/>
-                <a:latin typeface="Calibri" panose="020F0502020204030204" pitchFamily="34" charset="0"/>
-                <a:ea typeface="Times New Roman" panose="02020603050405020304" pitchFamily="18" charset="0"/>
-                <a:cs typeface="Times New Roman" panose="02020603050405020304" pitchFamily="18" charset="0"/>
-              </a:rPr>
-              <a:t>colums</a:t>
-            </a:r>
-            <a:r>
-              <a:rPr lang="en-GB" sz="1600" dirty="0">
-                <a:effectLst/>
-                <a:latin typeface="Calibri" panose="020F0502020204030204" pitchFamily="34" charset="0"/>
-                <a:ea typeface="Times New Roman" panose="02020603050405020304" pitchFamily="18" charset="0"/>
-                <a:cs typeface="Times New Roman" panose="02020603050405020304" pitchFamily="18" charset="0"/>
-              </a:rPr>
-              <a:t>:  120.96235945816058</a:t>
-            </a:r>
-            <a:endParaRPr lang="de-DE" sz="1600" dirty="0">
-              <a:effectLst/>
-              <a:latin typeface="Calibri" panose="020F0502020204030204" pitchFamily="34" charset="0"/>
-              <a:ea typeface="Times New Roman" panose="02020603050405020304" pitchFamily="18" charset="0"/>
-              <a:cs typeface="Times New Roman" panose="02020603050405020304" pitchFamily="18" charset="0"/>
-            </a:endParaRPr>
-          </a:p>
-          <a:p>
-            <a:pPr>
-              <a:lnSpc>
-                <a:spcPct val="107000"/>
-              </a:lnSpc>
-              <a:spcAft>
-                <a:spcPts val="800"/>
-              </a:spcAft>
-            </a:pPr>
-            <a:r>
-              <a:rPr lang="en-GB" sz="1600" dirty="0">
-                <a:effectLst/>
-                <a:latin typeface="Calibri" panose="020F0502020204030204" pitchFamily="34" charset="0"/>
-                <a:ea typeface="Times New Roman" panose="02020603050405020304" pitchFamily="18" charset="0"/>
-                <a:cs typeface="Times New Roman" panose="02020603050405020304" pitchFamily="18" charset="0"/>
-              </a:rPr>
-              <a:t>Missing Values in all SBP </a:t>
-            </a:r>
-            <a:r>
-              <a:rPr lang="en-GB" sz="1600" dirty="0" err="1">
-                <a:effectLst/>
-                <a:latin typeface="Calibri" panose="020F0502020204030204" pitchFamily="34" charset="0"/>
-                <a:ea typeface="Times New Roman" panose="02020603050405020304" pitchFamily="18" charset="0"/>
-                <a:cs typeface="Times New Roman" panose="02020603050405020304" pitchFamily="18" charset="0"/>
-              </a:rPr>
-              <a:t>colums</a:t>
-            </a:r>
-            <a:r>
-              <a:rPr lang="en-GB" sz="1600" dirty="0">
-                <a:effectLst/>
-                <a:latin typeface="Calibri" panose="020F0502020204030204" pitchFamily="34" charset="0"/>
-                <a:ea typeface="Times New Roman" panose="02020603050405020304" pitchFamily="18" charset="0"/>
-                <a:cs typeface="Times New Roman" panose="02020603050405020304" pitchFamily="18" charset="0"/>
-              </a:rPr>
-              <a:t>:  120201</a:t>
-            </a:r>
-          </a:p>
-          <a:p>
-            <a:pPr>
-              <a:lnSpc>
-                <a:spcPct val="107000"/>
-              </a:lnSpc>
-              <a:spcAft>
-                <a:spcPts val="800"/>
-              </a:spcAft>
-            </a:pPr>
-            <a:endParaRPr lang="en-GB" sz="1600" dirty="0">
-              <a:latin typeface="Calibri" panose="020F0502020204030204" pitchFamily="34" charset="0"/>
-              <a:ea typeface="Times New Roman" panose="02020603050405020304" pitchFamily="18" charset="0"/>
-              <a:cs typeface="Times New Roman" panose="02020603050405020304" pitchFamily="18" charset="0"/>
-            </a:endParaRPr>
-          </a:p>
-          <a:p>
-            <a:pPr>
-              <a:lnSpc>
-                <a:spcPct val="107000"/>
-              </a:lnSpc>
-              <a:spcAft>
-                <a:spcPts val="800"/>
-              </a:spcAft>
-            </a:pPr>
-            <a:r>
-              <a:rPr lang="en-GB" sz="1600" dirty="0">
-                <a:effectLst/>
-                <a:latin typeface="Calibri" panose="020F0502020204030204" pitchFamily="34" charset="0"/>
-                <a:ea typeface="Times New Roman" panose="02020603050405020304" pitchFamily="18" charset="0"/>
-                <a:cs typeface="Times New Roman" panose="02020603050405020304" pitchFamily="18" charset="0"/>
-              </a:rPr>
-              <a:t>…</a:t>
-            </a:r>
-            <a:endParaRPr lang="de-DE" sz="1600" dirty="0">
-              <a:effectLst/>
-              <a:latin typeface="Calibri" panose="020F0502020204030204" pitchFamily="34" charset="0"/>
-              <a:ea typeface="Times New Roman" panose="02020603050405020304" pitchFamily="18" charset="0"/>
-              <a:cs typeface="Times New Roman" panose="02020603050405020304" pitchFamily="18" charset="0"/>
-            </a:endParaRPr>
-          </a:p>
-          <a:p>
-            <a:pPr>
-              <a:lnSpc>
-                <a:spcPct val="107000"/>
-              </a:lnSpc>
-              <a:spcAft>
-                <a:spcPts val="800"/>
-              </a:spcAft>
-            </a:pPr>
-            <a:endParaRPr lang="en-US" sz="1600" dirty="0"/>
-          </a:p>
-        </p:txBody>
-      </p:sp>
+        </p:spPr>
+      </p:pic>
     </p:spTree>
     <p:extLst>
       <p:ext uri="{BB962C8B-B14F-4D97-AF65-F5344CB8AC3E}">
@@ -6850,8 +6490,13 @@
           <a:p>
             <a:r>
               <a:rPr lang="de-DE" sz="4000" noProof="0" dirty="0"/>
-              <a:t>2b) Subgroups</a:t>
-            </a:r>
+              <a:t>2</a:t>
+            </a:r>
+            <a:r>
+              <a:rPr lang="de-DE" dirty="0"/>
+              <a:t>a) Statistical Properties</a:t>
+            </a:r>
+            <a:endParaRPr lang="de-DE" sz="4000" noProof="0" dirty="0"/>
           </a:p>
         </p:txBody>
       </p:sp>
@@ -6885,53 +6530,24 @@
           <a:p>
             <a:r>
               <a:rPr lang="de-DE" dirty="0" err="1"/>
-              <a:t>Based</a:t>
+              <a:t>Examplary</a:t>
             </a:r>
             <a:r>
               <a:rPr lang="de-DE" dirty="0"/>
-              <a:t> on </a:t>
+              <a:t> Analysis </a:t>
             </a:r>
             <a:r>
               <a:rPr lang="de-DE" dirty="0" err="1"/>
-              <a:t>age</a:t>
+              <a:t>of</a:t>
             </a:r>
             <a:r>
               <a:rPr lang="de-DE" dirty="0"/>
+              <a:t> Features in Dataset A</a:t>
+            </a:r>
+            <a:r>
+              <a:rPr lang="de-DE" sz="2400" noProof="0" dirty="0"/>
               <a:t>:</a:t>
             </a:r>
-          </a:p>
-          <a:p>
-            <a:endParaRPr lang="de-DE" sz="2400" noProof="0" dirty="0"/>
-          </a:p>
-          <a:p>
-            <a:endParaRPr lang="de-DE" dirty="0"/>
-          </a:p>
-          <a:p>
-            <a:r>
-              <a:rPr lang="de-DE" sz="2400" noProof="0" dirty="0" err="1"/>
-              <a:t>Based</a:t>
-            </a:r>
-            <a:r>
-              <a:rPr lang="de-DE" sz="2400" noProof="0" dirty="0"/>
-              <a:t> on Gender:</a:t>
-            </a:r>
-          </a:p>
-          <a:p>
-            <a:endParaRPr lang="de-DE" dirty="0"/>
-          </a:p>
-          <a:p>
-            <a:endParaRPr lang="de-DE" sz="2400" noProof="0" dirty="0"/>
-          </a:p>
-          <a:p>
-            <a:r>
-              <a:rPr lang="de-DE" dirty="0" err="1"/>
-              <a:t>Etc</a:t>
-            </a:r>
-            <a:r>
-              <a:rPr lang="de-DE" dirty="0"/>
-              <a:t>: Nan</a:t>
-            </a:r>
-            <a:endParaRPr lang="de-DE" sz="2400" noProof="0" dirty="0"/>
           </a:p>
           <a:p>
             <a:endParaRPr lang="de-DE" sz="2400" noProof="0" dirty="0"/>
@@ -7056,10 +6672,959 @@
           </a:p>
         </p:txBody>
       </p:sp>
+      <p:sp>
+        <p:nvSpPr>
+          <p:cNvPr id="7" name="Textfeld 6">
+            <a:extLst>
+              <a:ext uri="{FF2B5EF4-FFF2-40B4-BE49-F238E27FC236}">
+                <a16:creationId xmlns:a16="http://schemas.microsoft.com/office/drawing/2014/main" id="{294E4BA2-991A-4788-8E84-B992F0B1D52C}"/>
+              </a:ext>
+            </a:extLst>
+          </p:cNvPr>
+          <p:cNvSpPr txBox="1"/>
+          <p:nvPr/>
+        </p:nvSpPr>
+        <p:spPr>
+          <a:xfrm>
+            <a:off x="838200" y="1566828"/>
+            <a:ext cx="6115050" cy="4370748"/>
+          </a:xfrm>
+          <a:prstGeom prst="rect">
+            <a:avLst/>
+          </a:prstGeom>
+          <a:noFill/>
+        </p:spPr>
+        <p:txBody>
+          <a:bodyPr wrap="square">
+            <a:spAutoFit/>
+          </a:bodyPr>
+          <a:lstStyle/>
+          <a:p>
+            <a:pPr>
+              <a:lnSpc>
+                <a:spcPct val="107000"/>
+              </a:lnSpc>
+              <a:spcAft>
+                <a:spcPts val="800"/>
+              </a:spcAft>
+            </a:pPr>
+            <a:r>
+              <a:rPr lang="en-GB" sz="1600" b="1" dirty="0">
+                <a:effectLst/>
+                <a:latin typeface="Calibri" panose="020F0502020204030204" pitchFamily="34" charset="0"/>
+                <a:ea typeface="Times New Roman" panose="02020603050405020304" pitchFamily="18" charset="0"/>
+                <a:cs typeface="Times New Roman" panose="02020603050405020304" pitchFamily="18" charset="0"/>
+              </a:rPr>
+              <a:t>HR [Heart Rate]</a:t>
+            </a:r>
+            <a:endParaRPr lang="de-DE" sz="1600" b="1" dirty="0">
+              <a:effectLst/>
+              <a:latin typeface="Calibri" panose="020F0502020204030204" pitchFamily="34" charset="0"/>
+              <a:ea typeface="Times New Roman" panose="02020603050405020304" pitchFamily="18" charset="0"/>
+              <a:cs typeface="Times New Roman" panose="02020603050405020304" pitchFamily="18" charset="0"/>
+            </a:endParaRPr>
+          </a:p>
+          <a:p>
+            <a:pPr>
+              <a:lnSpc>
+                <a:spcPct val="107000"/>
+              </a:lnSpc>
+              <a:spcAft>
+                <a:spcPts val="800"/>
+              </a:spcAft>
+            </a:pPr>
+            <a:r>
+              <a:rPr lang="en-GB" sz="1600" dirty="0">
+                <a:effectLst/>
+                <a:latin typeface="Calibri" panose="020F0502020204030204" pitchFamily="34" charset="0"/>
+                <a:ea typeface="Times New Roman" panose="02020603050405020304" pitchFamily="18" charset="0"/>
+                <a:cs typeface="Times New Roman" panose="02020603050405020304" pitchFamily="18" charset="0"/>
+              </a:rPr>
+              <a:t>Minimum Value in all HR </a:t>
+            </a:r>
+            <a:r>
+              <a:rPr lang="en-GB" sz="1600" dirty="0" err="1">
+                <a:effectLst/>
+                <a:latin typeface="Calibri" panose="020F0502020204030204" pitchFamily="34" charset="0"/>
+                <a:ea typeface="Times New Roman" panose="02020603050405020304" pitchFamily="18" charset="0"/>
+                <a:cs typeface="Times New Roman" panose="02020603050405020304" pitchFamily="18" charset="0"/>
+              </a:rPr>
+              <a:t>colums</a:t>
+            </a:r>
+            <a:r>
+              <a:rPr lang="en-GB" sz="1600" dirty="0">
+                <a:effectLst/>
+                <a:latin typeface="Calibri" panose="020F0502020204030204" pitchFamily="34" charset="0"/>
+                <a:ea typeface="Times New Roman" panose="02020603050405020304" pitchFamily="18" charset="0"/>
+                <a:cs typeface="Times New Roman" panose="02020603050405020304" pitchFamily="18" charset="0"/>
+              </a:rPr>
+              <a:t>:  ['p004712', 20.0]</a:t>
+            </a:r>
+            <a:endParaRPr lang="de-DE" sz="1600" dirty="0">
+              <a:effectLst/>
+              <a:latin typeface="Calibri" panose="020F0502020204030204" pitchFamily="34" charset="0"/>
+              <a:ea typeface="Times New Roman" panose="02020603050405020304" pitchFamily="18" charset="0"/>
+              <a:cs typeface="Times New Roman" panose="02020603050405020304" pitchFamily="18" charset="0"/>
+            </a:endParaRPr>
+          </a:p>
+          <a:p>
+            <a:pPr>
+              <a:lnSpc>
+                <a:spcPct val="107000"/>
+              </a:lnSpc>
+              <a:spcAft>
+                <a:spcPts val="800"/>
+              </a:spcAft>
+            </a:pPr>
+            <a:r>
+              <a:rPr lang="en-GB" sz="1600" dirty="0">
+                <a:effectLst/>
+                <a:latin typeface="Calibri" panose="020F0502020204030204" pitchFamily="34" charset="0"/>
+                <a:ea typeface="Times New Roman" panose="02020603050405020304" pitchFamily="18" charset="0"/>
+                <a:cs typeface="Times New Roman" panose="02020603050405020304" pitchFamily="18" charset="0"/>
+              </a:rPr>
+              <a:t>Maximum Value in all HR </a:t>
+            </a:r>
+            <a:r>
+              <a:rPr lang="en-GB" sz="1600" dirty="0" err="1">
+                <a:effectLst/>
+                <a:latin typeface="Calibri" panose="020F0502020204030204" pitchFamily="34" charset="0"/>
+                <a:ea typeface="Times New Roman" panose="02020603050405020304" pitchFamily="18" charset="0"/>
+                <a:cs typeface="Times New Roman" panose="02020603050405020304" pitchFamily="18" charset="0"/>
+              </a:rPr>
+              <a:t>colums</a:t>
+            </a:r>
+            <a:r>
+              <a:rPr lang="en-GB" sz="1600" dirty="0">
+                <a:effectLst/>
+                <a:latin typeface="Calibri" panose="020F0502020204030204" pitchFamily="34" charset="0"/>
+                <a:ea typeface="Times New Roman" panose="02020603050405020304" pitchFamily="18" charset="0"/>
+                <a:cs typeface="Times New Roman" panose="02020603050405020304" pitchFamily="18" charset="0"/>
+              </a:rPr>
+              <a:t>:  ['p008574', 280.0]</a:t>
+            </a:r>
+            <a:endParaRPr lang="de-DE" sz="1600" dirty="0">
+              <a:effectLst/>
+              <a:latin typeface="Calibri" panose="020F0502020204030204" pitchFamily="34" charset="0"/>
+              <a:ea typeface="Times New Roman" panose="02020603050405020304" pitchFamily="18" charset="0"/>
+              <a:cs typeface="Times New Roman" panose="02020603050405020304" pitchFamily="18" charset="0"/>
+            </a:endParaRPr>
+          </a:p>
+          <a:p>
+            <a:pPr>
+              <a:lnSpc>
+                <a:spcPct val="107000"/>
+              </a:lnSpc>
+              <a:spcAft>
+                <a:spcPts val="800"/>
+              </a:spcAft>
+            </a:pPr>
+            <a:r>
+              <a:rPr lang="en-GB" sz="1600" dirty="0">
+                <a:effectLst/>
+                <a:latin typeface="Calibri" panose="020F0502020204030204" pitchFamily="34" charset="0"/>
+                <a:ea typeface="Times New Roman" panose="02020603050405020304" pitchFamily="18" charset="0"/>
+                <a:cs typeface="Times New Roman" panose="02020603050405020304" pitchFamily="18" charset="0"/>
+              </a:rPr>
+              <a:t>Average Value in all HR </a:t>
+            </a:r>
+            <a:r>
+              <a:rPr lang="en-GB" sz="1600" dirty="0" err="1">
+                <a:effectLst/>
+                <a:latin typeface="Calibri" panose="020F0502020204030204" pitchFamily="34" charset="0"/>
+                <a:ea typeface="Times New Roman" panose="02020603050405020304" pitchFamily="18" charset="0"/>
+                <a:cs typeface="Times New Roman" panose="02020603050405020304" pitchFamily="18" charset="0"/>
+              </a:rPr>
+              <a:t>colums</a:t>
+            </a:r>
+            <a:r>
+              <a:rPr lang="en-GB" sz="1600" dirty="0">
+                <a:effectLst/>
+                <a:latin typeface="Calibri" panose="020F0502020204030204" pitchFamily="34" charset="0"/>
+                <a:ea typeface="Times New Roman" panose="02020603050405020304" pitchFamily="18" charset="0"/>
+                <a:cs typeface="Times New Roman" panose="02020603050405020304" pitchFamily="18" charset="0"/>
+              </a:rPr>
+              <a:t>:  84.98526444873023</a:t>
+            </a:r>
+            <a:endParaRPr lang="de-DE" sz="1600" dirty="0">
+              <a:effectLst/>
+              <a:latin typeface="Calibri" panose="020F0502020204030204" pitchFamily="34" charset="0"/>
+              <a:ea typeface="Times New Roman" panose="02020603050405020304" pitchFamily="18" charset="0"/>
+              <a:cs typeface="Times New Roman" panose="02020603050405020304" pitchFamily="18" charset="0"/>
+            </a:endParaRPr>
+          </a:p>
+          <a:p>
+            <a:pPr>
+              <a:lnSpc>
+                <a:spcPct val="107000"/>
+              </a:lnSpc>
+              <a:spcAft>
+                <a:spcPts val="800"/>
+              </a:spcAft>
+            </a:pPr>
+            <a:r>
+              <a:rPr lang="en-GB" sz="1600" dirty="0">
+                <a:effectLst/>
+                <a:latin typeface="Calibri" panose="020F0502020204030204" pitchFamily="34" charset="0"/>
+                <a:ea typeface="Times New Roman" panose="02020603050405020304" pitchFamily="18" charset="0"/>
+                <a:cs typeface="Times New Roman" panose="02020603050405020304" pitchFamily="18" charset="0"/>
+              </a:rPr>
+              <a:t>Missing Values in all HR </a:t>
+            </a:r>
+            <a:r>
+              <a:rPr lang="en-GB" sz="1600" dirty="0" err="1">
+                <a:effectLst/>
+                <a:latin typeface="Calibri" panose="020F0502020204030204" pitchFamily="34" charset="0"/>
+                <a:ea typeface="Times New Roman" panose="02020603050405020304" pitchFamily="18" charset="0"/>
+                <a:cs typeface="Times New Roman" panose="02020603050405020304" pitchFamily="18" charset="0"/>
+              </a:rPr>
+              <a:t>colums</a:t>
+            </a:r>
+            <a:r>
+              <a:rPr lang="en-GB" sz="1600" dirty="0">
+                <a:effectLst/>
+                <a:latin typeface="Calibri" panose="020F0502020204030204" pitchFamily="34" charset="0"/>
+                <a:ea typeface="Times New Roman" panose="02020603050405020304" pitchFamily="18" charset="0"/>
+                <a:cs typeface="Times New Roman" panose="02020603050405020304" pitchFamily="18" charset="0"/>
+              </a:rPr>
+              <a:t>:  61189</a:t>
+            </a:r>
+            <a:endParaRPr lang="de-DE" sz="1600" dirty="0">
+              <a:effectLst/>
+              <a:latin typeface="Calibri" panose="020F0502020204030204" pitchFamily="34" charset="0"/>
+              <a:ea typeface="Times New Roman" panose="02020603050405020304" pitchFamily="18" charset="0"/>
+              <a:cs typeface="Times New Roman" panose="02020603050405020304" pitchFamily="18" charset="0"/>
+            </a:endParaRPr>
+          </a:p>
+          <a:p>
+            <a:pPr>
+              <a:lnSpc>
+                <a:spcPct val="107000"/>
+              </a:lnSpc>
+              <a:spcAft>
+                <a:spcPts val="800"/>
+              </a:spcAft>
+            </a:pPr>
+            <a:r>
+              <a:rPr lang="en-GB" sz="1600" dirty="0">
+                <a:effectLst/>
+                <a:latin typeface="Calibri" panose="020F0502020204030204" pitchFamily="34" charset="0"/>
+                <a:ea typeface="Times New Roman" panose="02020603050405020304" pitchFamily="18" charset="0"/>
+                <a:cs typeface="Times New Roman" panose="02020603050405020304" pitchFamily="18" charset="0"/>
+              </a:rPr>
+              <a:t> </a:t>
+            </a:r>
+            <a:endParaRPr lang="de-DE" sz="1600" dirty="0">
+              <a:effectLst/>
+              <a:latin typeface="Calibri" panose="020F0502020204030204" pitchFamily="34" charset="0"/>
+              <a:ea typeface="Times New Roman" panose="02020603050405020304" pitchFamily="18" charset="0"/>
+              <a:cs typeface="Times New Roman" panose="02020603050405020304" pitchFamily="18" charset="0"/>
+            </a:endParaRPr>
+          </a:p>
+          <a:p>
+            <a:pPr>
+              <a:lnSpc>
+                <a:spcPct val="107000"/>
+              </a:lnSpc>
+              <a:spcAft>
+                <a:spcPts val="800"/>
+              </a:spcAft>
+            </a:pPr>
+            <a:r>
+              <a:rPr lang="en-GB" sz="1600" b="1" dirty="0">
+                <a:effectLst/>
+                <a:latin typeface="Calibri" panose="020F0502020204030204" pitchFamily="34" charset="0"/>
+                <a:ea typeface="Times New Roman" panose="02020603050405020304" pitchFamily="18" charset="0"/>
+                <a:cs typeface="Times New Roman" panose="02020603050405020304" pitchFamily="18" charset="0"/>
+              </a:rPr>
+              <a:t>O2Sat [O2 Saturation]</a:t>
+            </a:r>
+            <a:endParaRPr lang="de-DE" sz="1600" b="1" dirty="0">
+              <a:effectLst/>
+              <a:latin typeface="Calibri" panose="020F0502020204030204" pitchFamily="34" charset="0"/>
+              <a:ea typeface="Times New Roman" panose="02020603050405020304" pitchFamily="18" charset="0"/>
+              <a:cs typeface="Times New Roman" panose="02020603050405020304" pitchFamily="18" charset="0"/>
+            </a:endParaRPr>
+          </a:p>
+          <a:p>
+            <a:pPr>
+              <a:lnSpc>
+                <a:spcPct val="107000"/>
+              </a:lnSpc>
+              <a:spcAft>
+                <a:spcPts val="800"/>
+              </a:spcAft>
+            </a:pPr>
+            <a:r>
+              <a:rPr lang="en-GB" sz="1600" dirty="0">
+                <a:effectLst/>
+                <a:latin typeface="Calibri" panose="020F0502020204030204" pitchFamily="34" charset="0"/>
+                <a:ea typeface="Times New Roman" panose="02020603050405020304" pitchFamily="18" charset="0"/>
+                <a:cs typeface="Times New Roman" panose="02020603050405020304" pitchFamily="18" charset="0"/>
+              </a:rPr>
+              <a:t>Minimum Value in all O2Sat </a:t>
+            </a:r>
+            <a:r>
+              <a:rPr lang="en-GB" sz="1600" dirty="0" err="1">
+                <a:effectLst/>
+                <a:latin typeface="Calibri" panose="020F0502020204030204" pitchFamily="34" charset="0"/>
+                <a:ea typeface="Times New Roman" panose="02020603050405020304" pitchFamily="18" charset="0"/>
+                <a:cs typeface="Times New Roman" panose="02020603050405020304" pitchFamily="18" charset="0"/>
+              </a:rPr>
+              <a:t>colums</a:t>
+            </a:r>
+            <a:r>
+              <a:rPr lang="en-GB" sz="1600" dirty="0">
+                <a:effectLst/>
+                <a:latin typeface="Calibri" panose="020F0502020204030204" pitchFamily="34" charset="0"/>
+                <a:ea typeface="Times New Roman" panose="02020603050405020304" pitchFamily="18" charset="0"/>
+                <a:cs typeface="Times New Roman" panose="02020603050405020304" pitchFamily="18" charset="0"/>
+              </a:rPr>
+              <a:t>:  ['p014401', 20.0]</a:t>
+            </a:r>
+            <a:endParaRPr lang="de-DE" sz="1600" dirty="0">
+              <a:effectLst/>
+              <a:latin typeface="Calibri" panose="020F0502020204030204" pitchFamily="34" charset="0"/>
+              <a:ea typeface="Times New Roman" panose="02020603050405020304" pitchFamily="18" charset="0"/>
+              <a:cs typeface="Times New Roman" panose="02020603050405020304" pitchFamily="18" charset="0"/>
+            </a:endParaRPr>
+          </a:p>
+          <a:p>
+            <a:pPr>
+              <a:lnSpc>
+                <a:spcPct val="107000"/>
+              </a:lnSpc>
+              <a:spcAft>
+                <a:spcPts val="800"/>
+              </a:spcAft>
+            </a:pPr>
+            <a:r>
+              <a:rPr lang="en-GB" sz="1600" dirty="0">
+                <a:effectLst/>
+                <a:latin typeface="Calibri" panose="020F0502020204030204" pitchFamily="34" charset="0"/>
+                <a:ea typeface="Times New Roman" panose="02020603050405020304" pitchFamily="18" charset="0"/>
+                <a:cs typeface="Times New Roman" panose="02020603050405020304" pitchFamily="18" charset="0"/>
+              </a:rPr>
+              <a:t>Maximum Value in all O2Sat </a:t>
+            </a:r>
+            <a:r>
+              <a:rPr lang="en-GB" sz="1600" dirty="0" err="1">
+                <a:effectLst/>
+                <a:latin typeface="Calibri" panose="020F0502020204030204" pitchFamily="34" charset="0"/>
+                <a:ea typeface="Times New Roman" panose="02020603050405020304" pitchFamily="18" charset="0"/>
+                <a:cs typeface="Times New Roman" panose="02020603050405020304" pitchFamily="18" charset="0"/>
+              </a:rPr>
+              <a:t>colums</a:t>
+            </a:r>
+            <a:r>
+              <a:rPr lang="en-GB" sz="1600" dirty="0">
+                <a:effectLst/>
+                <a:latin typeface="Calibri" panose="020F0502020204030204" pitchFamily="34" charset="0"/>
+                <a:ea typeface="Times New Roman" panose="02020603050405020304" pitchFamily="18" charset="0"/>
+                <a:cs typeface="Times New Roman" panose="02020603050405020304" pitchFamily="18" charset="0"/>
+              </a:rPr>
+              <a:t>:  ['p000001', 100.0]</a:t>
+            </a:r>
+            <a:endParaRPr lang="de-DE" sz="1600" dirty="0">
+              <a:effectLst/>
+              <a:latin typeface="Calibri" panose="020F0502020204030204" pitchFamily="34" charset="0"/>
+              <a:ea typeface="Times New Roman" panose="02020603050405020304" pitchFamily="18" charset="0"/>
+              <a:cs typeface="Times New Roman" panose="02020603050405020304" pitchFamily="18" charset="0"/>
+            </a:endParaRPr>
+          </a:p>
+          <a:p>
+            <a:pPr>
+              <a:lnSpc>
+                <a:spcPct val="107000"/>
+              </a:lnSpc>
+              <a:spcAft>
+                <a:spcPts val="800"/>
+              </a:spcAft>
+            </a:pPr>
+            <a:r>
+              <a:rPr lang="en-GB" sz="1600" dirty="0">
+                <a:effectLst/>
+                <a:latin typeface="Calibri" panose="020F0502020204030204" pitchFamily="34" charset="0"/>
+                <a:ea typeface="Times New Roman" panose="02020603050405020304" pitchFamily="18" charset="0"/>
+                <a:cs typeface="Times New Roman" panose="02020603050405020304" pitchFamily="18" charset="0"/>
+              </a:rPr>
+              <a:t>Average Value in all O2Sat </a:t>
+            </a:r>
+            <a:r>
+              <a:rPr lang="en-GB" sz="1600" dirty="0" err="1">
+                <a:effectLst/>
+                <a:latin typeface="Calibri" panose="020F0502020204030204" pitchFamily="34" charset="0"/>
+                <a:ea typeface="Times New Roman" panose="02020603050405020304" pitchFamily="18" charset="0"/>
+                <a:cs typeface="Times New Roman" panose="02020603050405020304" pitchFamily="18" charset="0"/>
+              </a:rPr>
+              <a:t>colums</a:t>
+            </a:r>
+            <a:r>
+              <a:rPr lang="en-GB" sz="1600" dirty="0">
+                <a:effectLst/>
+                <a:latin typeface="Calibri" panose="020F0502020204030204" pitchFamily="34" charset="0"/>
+                <a:ea typeface="Times New Roman" panose="02020603050405020304" pitchFamily="18" charset="0"/>
+                <a:cs typeface="Times New Roman" panose="02020603050405020304" pitchFamily="18" charset="0"/>
+              </a:rPr>
+              <a:t>:  97.26568772153938</a:t>
+            </a:r>
+            <a:endParaRPr lang="de-DE" sz="1600" dirty="0">
+              <a:effectLst/>
+              <a:latin typeface="Calibri" panose="020F0502020204030204" pitchFamily="34" charset="0"/>
+              <a:ea typeface="Times New Roman" panose="02020603050405020304" pitchFamily="18" charset="0"/>
+              <a:cs typeface="Times New Roman" panose="02020603050405020304" pitchFamily="18" charset="0"/>
+            </a:endParaRPr>
+          </a:p>
+          <a:p>
+            <a:pPr>
+              <a:lnSpc>
+                <a:spcPct val="107000"/>
+              </a:lnSpc>
+              <a:spcAft>
+                <a:spcPts val="800"/>
+              </a:spcAft>
+            </a:pPr>
+            <a:r>
+              <a:rPr lang="en-GB" sz="1600" dirty="0">
+                <a:effectLst/>
+                <a:latin typeface="Calibri" panose="020F0502020204030204" pitchFamily="34" charset="0"/>
+                <a:ea typeface="Times New Roman" panose="02020603050405020304" pitchFamily="18" charset="0"/>
+                <a:cs typeface="Times New Roman" panose="02020603050405020304" pitchFamily="18" charset="0"/>
+              </a:rPr>
+              <a:t>Missing Values in all O2Sat </a:t>
+            </a:r>
+            <a:r>
+              <a:rPr lang="en-GB" sz="1600" dirty="0" err="1">
+                <a:effectLst/>
+                <a:latin typeface="Calibri" panose="020F0502020204030204" pitchFamily="34" charset="0"/>
+                <a:ea typeface="Times New Roman" panose="02020603050405020304" pitchFamily="18" charset="0"/>
+                <a:cs typeface="Times New Roman" panose="02020603050405020304" pitchFamily="18" charset="0"/>
+              </a:rPr>
+              <a:t>colums</a:t>
+            </a:r>
+            <a:r>
+              <a:rPr lang="en-GB" sz="1600" dirty="0">
+                <a:effectLst/>
+                <a:latin typeface="Calibri" panose="020F0502020204030204" pitchFamily="34" charset="0"/>
+                <a:ea typeface="Times New Roman" panose="02020603050405020304" pitchFamily="18" charset="0"/>
+                <a:cs typeface="Times New Roman" panose="02020603050405020304" pitchFamily="18" charset="0"/>
+              </a:rPr>
+              <a:t>:  95079</a:t>
+            </a:r>
+            <a:endParaRPr lang="de-DE" sz="1600" dirty="0">
+              <a:effectLst/>
+              <a:latin typeface="Calibri" panose="020F0502020204030204" pitchFamily="34" charset="0"/>
+              <a:ea typeface="Times New Roman" panose="02020603050405020304" pitchFamily="18" charset="0"/>
+              <a:cs typeface="Times New Roman" panose="02020603050405020304" pitchFamily="18" charset="0"/>
+            </a:endParaRPr>
+          </a:p>
+          <a:p>
+            <a:pPr>
+              <a:lnSpc>
+                <a:spcPct val="107000"/>
+              </a:lnSpc>
+              <a:spcAft>
+                <a:spcPts val="800"/>
+              </a:spcAft>
+            </a:pPr>
+            <a:r>
+              <a:rPr lang="en-GB" sz="1600" dirty="0">
+                <a:effectLst/>
+                <a:latin typeface="Calibri" panose="020F0502020204030204" pitchFamily="34" charset="0"/>
+                <a:ea typeface="Times New Roman" panose="02020603050405020304" pitchFamily="18" charset="0"/>
+                <a:cs typeface="Times New Roman" panose="02020603050405020304" pitchFamily="18" charset="0"/>
+              </a:rPr>
+              <a:t> </a:t>
+            </a:r>
+            <a:endParaRPr lang="de-DE" sz="1600" dirty="0">
+              <a:effectLst/>
+              <a:latin typeface="Calibri" panose="020F0502020204030204" pitchFamily="34" charset="0"/>
+              <a:ea typeface="Times New Roman" panose="02020603050405020304" pitchFamily="18" charset="0"/>
+              <a:cs typeface="Times New Roman" panose="02020603050405020304" pitchFamily="18" charset="0"/>
+            </a:endParaRPr>
+          </a:p>
+        </p:txBody>
+      </p:sp>
+      <p:sp>
+        <p:nvSpPr>
+          <p:cNvPr id="8" name="Textfeld 7">
+            <a:extLst>
+              <a:ext uri="{FF2B5EF4-FFF2-40B4-BE49-F238E27FC236}">
+                <a16:creationId xmlns:a16="http://schemas.microsoft.com/office/drawing/2014/main" id="{45538D4C-8124-4BFD-B852-82C65565DA30}"/>
+              </a:ext>
+            </a:extLst>
+          </p:cNvPr>
+          <p:cNvSpPr txBox="1"/>
+          <p:nvPr/>
+        </p:nvSpPr>
+        <p:spPr>
+          <a:xfrm>
+            <a:off x="6178550" y="1566828"/>
+            <a:ext cx="6096000" cy="5069914"/>
+          </a:xfrm>
+          <a:prstGeom prst="rect">
+            <a:avLst/>
+          </a:prstGeom>
+          <a:noFill/>
+        </p:spPr>
+        <p:txBody>
+          <a:bodyPr wrap="square">
+            <a:spAutoFit/>
+          </a:bodyPr>
+          <a:lstStyle/>
+          <a:p>
+            <a:pPr>
+              <a:lnSpc>
+                <a:spcPct val="107000"/>
+              </a:lnSpc>
+              <a:spcAft>
+                <a:spcPts val="800"/>
+              </a:spcAft>
+            </a:pPr>
+            <a:r>
+              <a:rPr lang="en-GB" sz="1600" b="1" dirty="0">
+                <a:effectLst/>
+                <a:latin typeface="Calibri" panose="020F0502020204030204" pitchFamily="34" charset="0"/>
+                <a:ea typeface="Times New Roman" panose="02020603050405020304" pitchFamily="18" charset="0"/>
+                <a:cs typeface="Times New Roman" panose="02020603050405020304" pitchFamily="18" charset="0"/>
+              </a:rPr>
+              <a:t>Temp [Temperature]</a:t>
+            </a:r>
+            <a:endParaRPr lang="de-DE" sz="1600" b="1" dirty="0">
+              <a:effectLst/>
+              <a:latin typeface="Calibri" panose="020F0502020204030204" pitchFamily="34" charset="0"/>
+              <a:ea typeface="Times New Roman" panose="02020603050405020304" pitchFamily="18" charset="0"/>
+              <a:cs typeface="Times New Roman" panose="02020603050405020304" pitchFamily="18" charset="0"/>
+            </a:endParaRPr>
+          </a:p>
+          <a:p>
+            <a:pPr>
+              <a:lnSpc>
+                <a:spcPct val="107000"/>
+              </a:lnSpc>
+              <a:spcAft>
+                <a:spcPts val="800"/>
+              </a:spcAft>
+            </a:pPr>
+            <a:r>
+              <a:rPr lang="en-GB" sz="1600" dirty="0">
+                <a:effectLst/>
+                <a:latin typeface="Calibri" panose="020F0502020204030204" pitchFamily="34" charset="0"/>
+                <a:ea typeface="Times New Roman" panose="02020603050405020304" pitchFamily="18" charset="0"/>
+                <a:cs typeface="Times New Roman" panose="02020603050405020304" pitchFamily="18" charset="0"/>
+              </a:rPr>
+              <a:t>Minimum Value in all Temp </a:t>
+            </a:r>
+            <a:r>
+              <a:rPr lang="en-GB" sz="1600" dirty="0" err="1">
+                <a:effectLst/>
+                <a:latin typeface="Calibri" panose="020F0502020204030204" pitchFamily="34" charset="0"/>
+                <a:ea typeface="Times New Roman" panose="02020603050405020304" pitchFamily="18" charset="0"/>
+                <a:cs typeface="Times New Roman" panose="02020603050405020304" pitchFamily="18" charset="0"/>
+              </a:rPr>
+              <a:t>colums</a:t>
+            </a:r>
+            <a:r>
+              <a:rPr lang="en-GB" sz="1600" dirty="0">
+                <a:effectLst/>
+                <a:latin typeface="Calibri" panose="020F0502020204030204" pitchFamily="34" charset="0"/>
+                <a:ea typeface="Times New Roman" panose="02020603050405020304" pitchFamily="18" charset="0"/>
+                <a:cs typeface="Times New Roman" panose="02020603050405020304" pitchFamily="18" charset="0"/>
+              </a:rPr>
+              <a:t>:  ['p002421', 20.9]</a:t>
+            </a:r>
+            <a:endParaRPr lang="de-DE" sz="1600" dirty="0">
+              <a:effectLst/>
+              <a:latin typeface="Calibri" panose="020F0502020204030204" pitchFamily="34" charset="0"/>
+              <a:ea typeface="Times New Roman" panose="02020603050405020304" pitchFamily="18" charset="0"/>
+              <a:cs typeface="Times New Roman" panose="02020603050405020304" pitchFamily="18" charset="0"/>
+            </a:endParaRPr>
+          </a:p>
+          <a:p>
+            <a:pPr>
+              <a:lnSpc>
+                <a:spcPct val="107000"/>
+              </a:lnSpc>
+              <a:spcAft>
+                <a:spcPts val="800"/>
+              </a:spcAft>
+            </a:pPr>
+            <a:r>
+              <a:rPr lang="en-GB" sz="1600" dirty="0">
+                <a:effectLst/>
+                <a:latin typeface="Calibri" panose="020F0502020204030204" pitchFamily="34" charset="0"/>
+                <a:ea typeface="Times New Roman" panose="02020603050405020304" pitchFamily="18" charset="0"/>
+                <a:cs typeface="Times New Roman" panose="02020603050405020304" pitchFamily="18" charset="0"/>
+              </a:rPr>
+              <a:t>Maximum Value in all Temp </a:t>
+            </a:r>
+            <a:r>
+              <a:rPr lang="en-GB" sz="1600" dirty="0" err="1">
+                <a:effectLst/>
+                <a:latin typeface="Calibri" panose="020F0502020204030204" pitchFamily="34" charset="0"/>
+                <a:ea typeface="Times New Roman" panose="02020603050405020304" pitchFamily="18" charset="0"/>
+                <a:cs typeface="Times New Roman" panose="02020603050405020304" pitchFamily="18" charset="0"/>
+              </a:rPr>
+              <a:t>colums</a:t>
+            </a:r>
+            <a:r>
+              <a:rPr lang="en-GB" sz="1600" dirty="0">
+                <a:effectLst/>
+                <a:latin typeface="Calibri" panose="020F0502020204030204" pitchFamily="34" charset="0"/>
+                <a:ea typeface="Times New Roman" panose="02020603050405020304" pitchFamily="18" charset="0"/>
+                <a:cs typeface="Times New Roman" panose="02020603050405020304" pitchFamily="18" charset="0"/>
+              </a:rPr>
+              <a:t>:  ['p015104', 42.22]</a:t>
+            </a:r>
+            <a:endParaRPr lang="de-DE" sz="1600" dirty="0">
+              <a:effectLst/>
+              <a:latin typeface="Calibri" panose="020F0502020204030204" pitchFamily="34" charset="0"/>
+              <a:ea typeface="Times New Roman" panose="02020603050405020304" pitchFamily="18" charset="0"/>
+              <a:cs typeface="Times New Roman" panose="02020603050405020304" pitchFamily="18" charset="0"/>
+            </a:endParaRPr>
+          </a:p>
+          <a:p>
+            <a:pPr>
+              <a:lnSpc>
+                <a:spcPct val="107000"/>
+              </a:lnSpc>
+              <a:spcAft>
+                <a:spcPts val="800"/>
+              </a:spcAft>
+            </a:pPr>
+            <a:r>
+              <a:rPr lang="en-GB" sz="1600" dirty="0">
+                <a:effectLst/>
+                <a:latin typeface="Calibri" panose="020F0502020204030204" pitchFamily="34" charset="0"/>
+                <a:ea typeface="Times New Roman" panose="02020603050405020304" pitchFamily="18" charset="0"/>
+                <a:cs typeface="Times New Roman" panose="02020603050405020304" pitchFamily="18" charset="0"/>
+              </a:rPr>
+              <a:t>Average Value in all Temp </a:t>
+            </a:r>
+            <a:r>
+              <a:rPr lang="en-GB" sz="1600" dirty="0" err="1">
+                <a:effectLst/>
+                <a:latin typeface="Calibri" panose="020F0502020204030204" pitchFamily="34" charset="0"/>
+                <a:ea typeface="Times New Roman" panose="02020603050405020304" pitchFamily="18" charset="0"/>
+                <a:cs typeface="Times New Roman" panose="02020603050405020304" pitchFamily="18" charset="0"/>
+              </a:rPr>
+              <a:t>colums</a:t>
+            </a:r>
+            <a:r>
+              <a:rPr lang="en-GB" sz="1600" dirty="0">
+                <a:effectLst/>
+                <a:latin typeface="Calibri" panose="020F0502020204030204" pitchFamily="34" charset="0"/>
+                <a:ea typeface="Times New Roman" panose="02020603050405020304" pitchFamily="18" charset="0"/>
+                <a:cs typeface="Times New Roman" panose="02020603050405020304" pitchFamily="18" charset="0"/>
+              </a:rPr>
+              <a:t>:  37.02673699236573</a:t>
+            </a:r>
+            <a:endParaRPr lang="de-DE" sz="1600" dirty="0">
+              <a:effectLst/>
+              <a:latin typeface="Calibri" panose="020F0502020204030204" pitchFamily="34" charset="0"/>
+              <a:ea typeface="Times New Roman" panose="02020603050405020304" pitchFamily="18" charset="0"/>
+              <a:cs typeface="Times New Roman" panose="02020603050405020304" pitchFamily="18" charset="0"/>
+            </a:endParaRPr>
+          </a:p>
+          <a:p>
+            <a:pPr>
+              <a:lnSpc>
+                <a:spcPct val="107000"/>
+              </a:lnSpc>
+              <a:spcAft>
+                <a:spcPts val="800"/>
+              </a:spcAft>
+            </a:pPr>
+            <a:r>
+              <a:rPr lang="en-GB" sz="1600" dirty="0">
+                <a:effectLst/>
+                <a:latin typeface="Calibri" panose="020F0502020204030204" pitchFamily="34" charset="0"/>
+                <a:ea typeface="Times New Roman" panose="02020603050405020304" pitchFamily="18" charset="0"/>
+                <a:cs typeface="Times New Roman" panose="02020603050405020304" pitchFamily="18" charset="0"/>
+              </a:rPr>
+              <a:t>Missing Values in all Temp </a:t>
+            </a:r>
+            <a:r>
+              <a:rPr lang="en-GB" sz="1600" dirty="0" err="1">
+                <a:effectLst/>
+                <a:latin typeface="Calibri" panose="020F0502020204030204" pitchFamily="34" charset="0"/>
+                <a:ea typeface="Times New Roman" panose="02020603050405020304" pitchFamily="18" charset="0"/>
+                <a:cs typeface="Times New Roman" panose="02020603050405020304" pitchFamily="18" charset="0"/>
+              </a:rPr>
+              <a:t>colums</a:t>
+            </a:r>
+            <a:r>
+              <a:rPr lang="en-GB" sz="1600" dirty="0">
+                <a:effectLst/>
+                <a:latin typeface="Calibri" panose="020F0502020204030204" pitchFamily="34" charset="0"/>
+                <a:ea typeface="Times New Roman" panose="02020603050405020304" pitchFamily="18" charset="0"/>
+                <a:cs typeface="Times New Roman" panose="02020603050405020304" pitchFamily="18" charset="0"/>
+              </a:rPr>
+              <a:t>:  523314  </a:t>
+            </a:r>
+          </a:p>
+          <a:p>
+            <a:pPr>
+              <a:lnSpc>
+                <a:spcPct val="107000"/>
+              </a:lnSpc>
+              <a:spcAft>
+                <a:spcPts val="800"/>
+              </a:spcAft>
+            </a:pPr>
+            <a:endParaRPr lang="en-GB" sz="1400" dirty="0">
+              <a:latin typeface="Calibri" panose="020F0502020204030204" pitchFamily="34" charset="0"/>
+              <a:cs typeface="Times New Roman" panose="02020603050405020304" pitchFamily="18" charset="0"/>
+            </a:endParaRPr>
+          </a:p>
+          <a:p>
+            <a:pPr>
+              <a:lnSpc>
+                <a:spcPct val="107000"/>
+              </a:lnSpc>
+              <a:spcAft>
+                <a:spcPts val="800"/>
+              </a:spcAft>
+            </a:pPr>
+            <a:r>
+              <a:rPr lang="en-GB" sz="1600" b="1" dirty="0">
+                <a:effectLst/>
+                <a:latin typeface="Calibri" panose="020F0502020204030204" pitchFamily="34" charset="0"/>
+                <a:ea typeface="Times New Roman" panose="02020603050405020304" pitchFamily="18" charset="0"/>
+                <a:cs typeface="Times New Roman" panose="02020603050405020304" pitchFamily="18" charset="0"/>
+              </a:rPr>
+              <a:t>SBP [Systolic BP]</a:t>
+            </a:r>
+            <a:endParaRPr lang="de-DE" sz="1600" b="1" dirty="0">
+              <a:effectLst/>
+              <a:latin typeface="Calibri" panose="020F0502020204030204" pitchFamily="34" charset="0"/>
+              <a:ea typeface="Times New Roman" panose="02020603050405020304" pitchFamily="18" charset="0"/>
+              <a:cs typeface="Times New Roman" panose="02020603050405020304" pitchFamily="18" charset="0"/>
+            </a:endParaRPr>
+          </a:p>
+          <a:p>
+            <a:pPr>
+              <a:lnSpc>
+                <a:spcPct val="107000"/>
+              </a:lnSpc>
+              <a:spcAft>
+                <a:spcPts val="800"/>
+              </a:spcAft>
+            </a:pPr>
+            <a:r>
+              <a:rPr lang="en-GB" sz="1600" dirty="0">
+                <a:effectLst/>
+                <a:latin typeface="Calibri" panose="020F0502020204030204" pitchFamily="34" charset="0"/>
+                <a:ea typeface="Times New Roman" panose="02020603050405020304" pitchFamily="18" charset="0"/>
+                <a:cs typeface="Times New Roman" panose="02020603050405020304" pitchFamily="18" charset="0"/>
+              </a:rPr>
+              <a:t>Minimum Value in all SBP </a:t>
+            </a:r>
+            <a:r>
+              <a:rPr lang="en-GB" sz="1600" dirty="0" err="1">
+                <a:effectLst/>
+                <a:latin typeface="Calibri" panose="020F0502020204030204" pitchFamily="34" charset="0"/>
+                <a:ea typeface="Times New Roman" panose="02020603050405020304" pitchFamily="18" charset="0"/>
+                <a:cs typeface="Times New Roman" panose="02020603050405020304" pitchFamily="18" charset="0"/>
+              </a:rPr>
+              <a:t>colums</a:t>
+            </a:r>
+            <a:r>
+              <a:rPr lang="en-GB" sz="1600" dirty="0">
+                <a:effectLst/>
+                <a:latin typeface="Calibri" panose="020F0502020204030204" pitchFamily="34" charset="0"/>
+                <a:ea typeface="Times New Roman" panose="02020603050405020304" pitchFamily="18" charset="0"/>
+                <a:cs typeface="Times New Roman" panose="02020603050405020304" pitchFamily="18" charset="0"/>
+              </a:rPr>
+              <a:t>:  ['p014968', 22.0]</a:t>
+            </a:r>
+            <a:endParaRPr lang="de-DE" sz="1600" dirty="0">
+              <a:effectLst/>
+              <a:latin typeface="Calibri" panose="020F0502020204030204" pitchFamily="34" charset="0"/>
+              <a:ea typeface="Times New Roman" panose="02020603050405020304" pitchFamily="18" charset="0"/>
+              <a:cs typeface="Times New Roman" panose="02020603050405020304" pitchFamily="18" charset="0"/>
+            </a:endParaRPr>
+          </a:p>
+          <a:p>
+            <a:pPr>
+              <a:lnSpc>
+                <a:spcPct val="107000"/>
+              </a:lnSpc>
+              <a:spcAft>
+                <a:spcPts val="800"/>
+              </a:spcAft>
+            </a:pPr>
+            <a:r>
+              <a:rPr lang="en-GB" sz="1600" dirty="0">
+                <a:effectLst/>
+                <a:latin typeface="Calibri" panose="020F0502020204030204" pitchFamily="34" charset="0"/>
+                <a:ea typeface="Times New Roman" panose="02020603050405020304" pitchFamily="18" charset="0"/>
+                <a:cs typeface="Times New Roman" panose="02020603050405020304" pitchFamily="18" charset="0"/>
+              </a:rPr>
+              <a:t>Maximum Value in all SBP </a:t>
+            </a:r>
+            <a:r>
+              <a:rPr lang="en-GB" sz="1600" dirty="0" err="1">
+                <a:effectLst/>
+                <a:latin typeface="Calibri" panose="020F0502020204030204" pitchFamily="34" charset="0"/>
+                <a:ea typeface="Times New Roman" panose="02020603050405020304" pitchFamily="18" charset="0"/>
+                <a:cs typeface="Times New Roman" panose="02020603050405020304" pitchFamily="18" charset="0"/>
+              </a:rPr>
+              <a:t>colums</a:t>
+            </a:r>
+            <a:r>
+              <a:rPr lang="en-GB" sz="1600" dirty="0">
+                <a:effectLst/>
+                <a:latin typeface="Calibri" panose="020F0502020204030204" pitchFamily="34" charset="0"/>
+                <a:ea typeface="Times New Roman" panose="02020603050405020304" pitchFamily="18" charset="0"/>
+                <a:cs typeface="Times New Roman" panose="02020603050405020304" pitchFamily="18" charset="0"/>
+              </a:rPr>
+              <a:t>:  ['p005749', 281.0]</a:t>
+            </a:r>
+            <a:endParaRPr lang="de-DE" sz="1600" dirty="0">
+              <a:effectLst/>
+              <a:latin typeface="Calibri" panose="020F0502020204030204" pitchFamily="34" charset="0"/>
+              <a:ea typeface="Times New Roman" panose="02020603050405020304" pitchFamily="18" charset="0"/>
+              <a:cs typeface="Times New Roman" panose="02020603050405020304" pitchFamily="18" charset="0"/>
+            </a:endParaRPr>
+          </a:p>
+          <a:p>
+            <a:pPr>
+              <a:lnSpc>
+                <a:spcPct val="107000"/>
+              </a:lnSpc>
+              <a:spcAft>
+                <a:spcPts val="800"/>
+              </a:spcAft>
+            </a:pPr>
+            <a:r>
+              <a:rPr lang="en-GB" sz="1600" dirty="0">
+                <a:effectLst/>
+                <a:latin typeface="Calibri" panose="020F0502020204030204" pitchFamily="34" charset="0"/>
+                <a:ea typeface="Times New Roman" panose="02020603050405020304" pitchFamily="18" charset="0"/>
+                <a:cs typeface="Times New Roman" panose="02020603050405020304" pitchFamily="18" charset="0"/>
+              </a:rPr>
+              <a:t>Average Value in all SBP </a:t>
+            </a:r>
+            <a:r>
+              <a:rPr lang="en-GB" sz="1600" dirty="0" err="1">
+                <a:effectLst/>
+                <a:latin typeface="Calibri" panose="020F0502020204030204" pitchFamily="34" charset="0"/>
+                <a:ea typeface="Times New Roman" panose="02020603050405020304" pitchFamily="18" charset="0"/>
+                <a:cs typeface="Times New Roman" panose="02020603050405020304" pitchFamily="18" charset="0"/>
+              </a:rPr>
+              <a:t>colums</a:t>
+            </a:r>
+            <a:r>
+              <a:rPr lang="en-GB" sz="1600" dirty="0">
+                <a:effectLst/>
+                <a:latin typeface="Calibri" panose="020F0502020204030204" pitchFamily="34" charset="0"/>
+                <a:ea typeface="Times New Roman" panose="02020603050405020304" pitchFamily="18" charset="0"/>
+                <a:cs typeface="Times New Roman" panose="02020603050405020304" pitchFamily="18" charset="0"/>
+              </a:rPr>
+              <a:t>:  120.96235945816058</a:t>
+            </a:r>
+            <a:endParaRPr lang="de-DE" sz="1600" dirty="0">
+              <a:effectLst/>
+              <a:latin typeface="Calibri" panose="020F0502020204030204" pitchFamily="34" charset="0"/>
+              <a:ea typeface="Times New Roman" panose="02020603050405020304" pitchFamily="18" charset="0"/>
+              <a:cs typeface="Times New Roman" panose="02020603050405020304" pitchFamily="18" charset="0"/>
+            </a:endParaRPr>
+          </a:p>
+          <a:p>
+            <a:pPr>
+              <a:lnSpc>
+                <a:spcPct val="107000"/>
+              </a:lnSpc>
+              <a:spcAft>
+                <a:spcPts val="800"/>
+              </a:spcAft>
+            </a:pPr>
+            <a:r>
+              <a:rPr lang="en-GB" sz="1600" dirty="0">
+                <a:effectLst/>
+                <a:latin typeface="Calibri" panose="020F0502020204030204" pitchFamily="34" charset="0"/>
+                <a:ea typeface="Times New Roman" panose="02020603050405020304" pitchFamily="18" charset="0"/>
+                <a:cs typeface="Times New Roman" panose="02020603050405020304" pitchFamily="18" charset="0"/>
+              </a:rPr>
+              <a:t>Missing Values in all SBP </a:t>
+            </a:r>
+            <a:r>
+              <a:rPr lang="en-GB" sz="1600" dirty="0" err="1">
+                <a:effectLst/>
+                <a:latin typeface="Calibri" panose="020F0502020204030204" pitchFamily="34" charset="0"/>
+                <a:ea typeface="Times New Roman" panose="02020603050405020304" pitchFamily="18" charset="0"/>
+                <a:cs typeface="Times New Roman" panose="02020603050405020304" pitchFamily="18" charset="0"/>
+              </a:rPr>
+              <a:t>colums</a:t>
+            </a:r>
+            <a:r>
+              <a:rPr lang="en-GB" sz="1600" dirty="0">
+                <a:effectLst/>
+                <a:latin typeface="Calibri" panose="020F0502020204030204" pitchFamily="34" charset="0"/>
+                <a:ea typeface="Times New Roman" panose="02020603050405020304" pitchFamily="18" charset="0"/>
+                <a:cs typeface="Times New Roman" panose="02020603050405020304" pitchFamily="18" charset="0"/>
+              </a:rPr>
+              <a:t>:  120201</a:t>
+            </a:r>
+          </a:p>
+          <a:p>
+            <a:pPr>
+              <a:lnSpc>
+                <a:spcPct val="107000"/>
+              </a:lnSpc>
+              <a:spcAft>
+                <a:spcPts val="800"/>
+              </a:spcAft>
+            </a:pPr>
+            <a:endParaRPr lang="en-GB" sz="1600" dirty="0">
+              <a:latin typeface="Calibri" panose="020F0502020204030204" pitchFamily="34" charset="0"/>
+              <a:ea typeface="Times New Roman" panose="02020603050405020304" pitchFamily="18" charset="0"/>
+              <a:cs typeface="Times New Roman" panose="02020603050405020304" pitchFamily="18" charset="0"/>
+            </a:endParaRPr>
+          </a:p>
+          <a:p>
+            <a:pPr>
+              <a:lnSpc>
+                <a:spcPct val="107000"/>
+              </a:lnSpc>
+              <a:spcAft>
+                <a:spcPts val="800"/>
+              </a:spcAft>
+            </a:pPr>
+            <a:r>
+              <a:rPr lang="en-GB" sz="1600" dirty="0">
+                <a:effectLst/>
+                <a:latin typeface="Calibri" panose="020F0502020204030204" pitchFamily="34" charset="0"/>
+                <a:ea typeface="Times New Roman" panose="02020603050405020304" pitchFamily="18" charset="0"/>
+                <a:cs typeface="Times New Roman" panose="02020603050405020304" pitchFamily="18" charset="0"/>
+              </a:rPr>
+              <a:t>…</a:t>
+            </a:r>
+            <a:endParaRPr lang="de-DE" sz="1600" dirty="0">
+              <a:effectLst/>
+              <a:latin typeface="Calibri" panose="020F0502020204030204" pitchFamily="34" charset="0"/>
+              <a:ea typeface="Times New Roman" panose="02020603050405020304" pitchFamily="18" charset="0"/>
+              <a:cs typeface="Times New Roman" panose="02020603050405020304" pitchFamily="18" charset="0"/>
+            </a:endParaRPr>
+          </a:p>
+          <a:p>
+            <a:pPr>
+              <a:lnSpc>
+                <a:spcPct val="107000"/>
+              </a:lnSpc>
+              <a:spcAft>
+                <a:spcPts val="800"/>
+              </a:spcAft>
+            </a:pPr>
+            <a:endParaRPr lang="en-US" sz="1600" dirty="0"/>
+          </a:p>
+        </p:txBody>
+      </p:sp>
     </p:spTree>
     <p:extLst>
       <p:ext uri="{BB962C8B-B14F-4D97-AF65-F5344CB8AC3E}">
-        <p14:creationId xmlns:p14="http://schemas.microsoft.com/office/powerpoint/2010/main" val="3755114492"/>
+        <p14:creationId xmlns:p14="http://schemas.microsoft.com/office/powerpoint/2010/main" val="3726796363"/>
       </p:ext>
     </p:extLst>
   </p:cSld>
@@ -7111,15 +7676,7 @@
           <a:p>
             <a:r>
               <a:rPr lang="de-DE" sz="4000" noProof="0" dirty="0"/>
-              <a:t>2c) </a:t>
-            </a:r>
-            <a:r>
-              <a:rPr lang="de-DE" sz="4000" noProof="0" dirty="0" err="1"/>
-              <a:t>Timeseries</a:t>
-            </a:r>
-            <a:r>
-              <a:rPr lang="de-DE" sz="4000" noProof="0" dirty="0"/>
-              <a:t> Data</a:t>
+              <a:t>2b) Subgroups</a:t>
             </a:r>
           </a:p>
         </p:txBody>
@@ -7154,48 +7711,53 @@
           <a:p>
             <a:r>
               <a:rPr lang="de-DE" dirty="0" err="1"/>
-              <a:t>Amount</a:t>
+              <a:t>Based</a:t>
             </a:r>
             <a:r>
               <a:rPr lang="de-DE" dirty="0"/>
-              <a:t> </a:t>
+              <a:t> on </a:t>
             </a:r>
             <a:r>
               <a:rPr lang="de-DE" dirty="0" err="1"/>
-              <a:t>of</a:t>
+              <a:t>age</a:t>
             </a:r>
             <a:r>
               <a:rPr lang="de-DE" dirty="0"/>
-              <a:t> </a:t>
-            </a:r>
+              <a:t>:</a:t>
+            </a:r>
+          </a:p>
+          <a:p>
+            <a:endParaRPr lang="de-DE" sz="2400" noProof="0" dirty="0"/>
+          </a:p>
+          <a:p>
+            <a:endParaRPr lang="de-DE" dirty="0"/>
+          </a:p>
+          <a:p>
+            <a:r>
+              <a:rPr lang="de-DE" sz="2400" noProof="0" dirty="0" err="1"/>
+              <a:t>Based</a:t>
+            </a:r>
+            <a:r>
+              <a:rPr lang="de-DE" sz="2400" noProof="0" dirty="0"/>
+              <a:t> on Gender:</a:t>
+            </a:r>
+          </a:p>
+          <a:p>
+            <a:endParaRPr lang="de-DE" dirty="0"/>
+          </a:p>
+          <a:p>
+            <a:endParaRPr lang="de-DE" sz="2400" noProof="0" dirty="0"/>
+          </a:p>
+          <a:p>
             <a:r>
               <a:rPr lang="de-DE" dirty="0" err="1"/>
-              <a:t>Timeseries</a:t>
+              <a:t>Etc</a:t>
             </a:r>
             <a:r>
               <a:rPr lang="de-DE" dirty="0"/>
-              <a:t> in </a:t>
-            </a:r>
-            <a:r>
-              <a:rPr lang="de-DE" dirty="0" err="1"/>
-              <a:t>the</a:t>
-            </a:r>
-            <a:r>
-              <a:rPr lang="de-DE" dirty="0"/>
-              <a:t> </a:t>
-            </a:r>
-            <a:r>
-              <a:rPr lang="de-DE" dirty="0" err="1"/>
-              <a:t>complete</a:t>
-            </a:r>
-            <a:r>
-              <a:rPr lang="de-DE" dirty="0"/>
-              <a:t> Dataset A</a:t>
-            </a:r>
-            <a:r>
-              <a:rPr lang="de-DE" sz="2400" noProof="0" dirty="0"/>
-              <a:t>:</a:t>
-            </a:r>
+              <a:t>: Nan</a:t>
+            </a:r>
+            <a:endParaRPr lang="de-DE" sz="2400" noProof="0" dirty="0"/>
           </a:p>
           <a:p>
             <a:endParaRPr lang="de-DE" sz="2400" noProof="0" dirty="0"/>
@@ -7320,164 +7882,213 @@
           </a:p>
         </p:txBody>
       </p:sp>
-      <p:sp>
-        <p:nvSpPr>
-          <p:cNvPr id="7" name="Textfeld 6">
-            <a:extLst>
-              <a:ext uri="{FF2B5EF4-FFF2-40B4-BE49-F238E27FC236}">
-                <a16:creationId xmlns:a16="http://schemas.microsoft.com/office/drawing/2014/main" id="{294E4BA2-991A-4788-8E84-B992F0B1D52C}"/>
-              </a:ext>
-            </a:extLst>
-          </p:cNvPr>
-          <p:cNvSpPr txBox="1"/>
+      <p:pic>
+        <p:nvPicPr>
+          <p:cNvPr id="7" name="Grafik 6">
+            <a:extLst>
+              <a:ext uri="{FF2B5EF4-FFF2-40B4-BE49-F238E27FC236}">
+                <a16:creationId xmlns:a16="http://schemas.microsoft.com/office/drawing/2014/main" id="{B2FB9536-E7E8-4237-B471-17E50BB3628D}"/>
+              </a:ext>
+            </a:extLst>
+          </p:cNvPr>
+          <p:cNvPicPr>
+            <a:picLocks noChangeAspect="1"/>
+          </p:cNvPicPr>
           <p:nvPr/>
-        </p:nvSpPr>
-        <p:spPr>
-          <a:xfrm>
-            <a:off x="3038475" y="1896043"/>
-            <a:ext cx="6115050" cy="1971374"/>
+        </p:nvPicPr>
+        <p:blipFill>
+          <a:blip r:embed="rId2"/>
+          <a:stretch>
+            <a:fillRect/>
+          </a:stretch>
+        </p:blipFill>
+        <p:spPr>
+          <a:xfrm>
+            <a:off x="7481268" y="1104159"/>
+            <a:ext cx="3872532" cy="1602892"/>
           </a:xfrm>
           <a:prstGeom prst="rect">
             <a:avLst/>
           </a:prstGeom>
-          <a:noFill/>
-        </p:spPr>
-        <p:txBody>
-          <a:bodyPr wrap="square">
-            <a:spAutoFit/>
-          </a:bodyPr>
+        </p:spPr>
+      </p:pic>
+      <p:pic>
+        <p:nvPicPr>
+          <p:cNvPr id="9" name="Grafik 8">
+            <a:extLst>
+              <a:ext uri="{FF2B5EF4-FFF2-40B4-BE49-F238E27FC236}">
+                <a16:creationId xmlns:a16="http://schemas.microsoft.com/office/drawing/2014/main" id="{B3A2F092-7624-4BC5-85C4-2E3FB55875A5}"/>
+              </a:ext>
+            </a:extLst>
+          </p:cNvPr>
+          <p:cNvPicPr>
+            <a:picLocks noChangeAspect="1"/>
+          </p:cNvPicPr>
+          <p:nvPr/>
+        </p:nvPicPr>
+        <p:blipFill>
+          <a:blip r:embed="rId3"/>
+          <a:stretch>
+            <a:fillRect/>
+          </a:stretch>
+        </p:blipFill>
+        <p:spPr>
+          <a:xfrm>
+            <a:off x="1200150" y="1375750"/>
+            <a:ext cx="4895850" cy="495300"/>
+          </a:xfrm>
+          <a:prstGeom prst="rect">
+            <a:avLst/>
+          </a:prstGeom>
+        </p:spPr>
+      </p:pic>
+      <p:pic>
+        <p:nvPicPr>
+          <p:cNvPr id="11" name="Grafik 10">
+            <a:extLst>
+              <a:ext uri="{FF2B5EF4-FFF2-40B4-BE49-F238E27FC236}">
+                <a16:creationId xmlns:a16="http://schemas.microsoft.com/office/drawing/2014/main" id="{60868CA4-EAA4-4F06-AC80-D0642F0209F7}"/>
+              </a:ext>
+            </a:extLst>
+          </p:cNvPr>
+          <p:cNvPicPr>
+            <a:picLocks noChangeAspect="1"/>
+          </p:cNvPicPr>
+          <p:nvPr/>
+        </p:nvPicPr>
+        <p:blipFill>
+          <a:blip r:embed="rId4"/>
+          <a:stretch>
+            <a:fillRect/>
+          </a:stretch>
+        </p:blipFill>
+        <p:spPr>
+          <a:xfrm>
+            <a:off x="1200150" y="2829165"/>
+            <a:ext cx="3609975" cy="466725"/>
+          </a:xfrm>
+          <a:prstGeom prst="rect">
+            <a:avLst/>
+          </a:prstGeom>
+        </p:spPr>
+      </p:pic>
+      <p:pic>
+        <p:nvPicPr>
+          <p:cNvPr id="14" name="Grafik 13">
+            <a:extLst>
+              <a:ext uri="{FF2B5EF4-FFF2-40B4-BE49-F238E27FC236}">
+                <a16:creationId xmlns:a16="http://schemas.microsoft.com/office/drawing/2014/main" id="{8D932480-CA5D-4AF5-A7B6-AE9921495489}"/>
+              </a:ext>
+            </a:extLst>
+          </p:cNvPr>
+          <p:cNvPicPr>
+            <a:picLocks noChangeAspect="1"/>
+          </p:cNvPicPr>
+          <p:nvPr/>
+        </p:nvPicPr>
+        <p:blipFill>
+          <a:blip r:embed="rId5"/>
+          <a:stretch>
+            <a:fillRect/>
+          </a:stretch>
+        </p:blipFill>
+        <p:spPr>
+          <a:xfrm>
+            <a:off x="1200150" y="4094402"/>
+            <a:ext cx="4876800" cy="466725"/>
+          </a:xfrm>
+          <a:prstGeom prst="rect">
+            <a:avLst/>
+          </a:prstGeom>
+        </p:spPr>
+      </p:pic>
+      <p:pic>
+        <p:nvPicPr>
+          <p:cNvPr id="16" name="Grafik 15">
+            <a:extLst>
+              <a:ext uri="{FF2B5EF4-FFF2-40B4-BE49-F238E27FC236}">
+                <a16:creationId xmlns:a16="http://schemas.microsoft.com/office/drawing/2014/main" id="{7E7AD10A-0749-44D4-924A-9B1E0EE8ECC4}"/>
+              </a:ext>
+            </a:extLst>
+          </p:cNvPr>
+          <p:cNvPicPr>
+            <a:picLocks noChangeAspect="1"/>
+          </p:cNvPicPr>
+          <p:nvPr/>
+        </p:nvPicPr>
+        <p:blipFill>
+          <a:blip r:embed="rId6"/>
+          <a:stretch>
+            <a:fillRect/>
+          </a:stretch>
+        </p:blipFill>
+        <p:spPr>
+          <a:xfrm>
+            <a:off x="7477125" y="4327764"/>
+            <a:ext cx="4238625" cy="1323975"/>
+          </a:xfrm>
+          <a:prstGeom prst="rect">
+            <a:avLst/>
+          </a:prstGeom>
+        </p:spPr>
+      </p:pic>
+      <p:sp>
+        <p:nvSpPr>
+          <p:cNvPr id="17" name="Pfeil: nach unten 16">
+            <a:extLst>
+              <a:ext uri="{FF2B5EF4-FFF2-40B4-BE49-F238E27FC236}">
+                <a16:creationId xmlns:a16="http://schemas.microsoft.com/office/drawing/2014/main" id="{DA889599-1D5C-41BD-BA85-DA7434388207}"/>
+              </a:ext>
+            </a:extLst>
+          </p:cNvPr>
+          <p:cNvSpPr/>
+          <p:nvPr/>
+        </p:nvSpPr>
+        <p:spPr>
+          <a:xfrm>
+            <a:off x="8554140" y="2881730"/>
+            <a:ext cx="1736035" cy="1269220"/>
+          </a:xfrm>
+          <a:prstGeom prst="downArrow">
+            <a:avLst/>
+          </a:prstGeom>
+        </p:spPr>
+        <p:style>
+          <a:lnRef idx="2">
+            <a:schemeClr val="accent2">
+              <a:shade val="50000"/>
+            </a:schemeClr>
+          </a:lnRef>
+          <a:fillRef idx="1">
+            <a:schemeClr val="accent2"/>
+          </a:fillRef>
+          <a:effectRef idx="0">
+            <a:schemeClr val="accent2"/>
+          </a:effectRef>
+          <a:fontRef idx="minor">
+            <a:schemeClr val="lt1"/>
+          </a:fontRef>
+        </p:style>
+        <p:txBody>
+          <a:bodyPr rtlCol="0" anchor="ctr"/>
           <a:lstStyle/>
           <a:p>
-            <a:pPr>
-              <a:lnSpc>
-                <a:spcPct val="107000"/>
-              </a:lnSpc>
-              <a:spcAft>
-                <a:spcPts val="800"/>
-              </a:spcAft>
-            </a:pPr>
-            <a:r>
-              <a:rPr lang="en-GB" sz="1800" dirty="0">
-                <a:effectLst/>
-                <a:latin typeface="Calibri" panose="020F0502020204030204" pitchFamily="34" charset="0"/>
-                <a:ea typeface="Times New Roman" panose="02020603050405020304" pitchFamily="18" charset="0"/>
-                <a:cs typeface="Times New Roman" panose="02020603050405020304" pitchFamily="18" charset="0"/>
-              </a:rPr>
-              <a:t>Average amount of timeseries in all data:  38.857</a:t>
-            </a:r>
-            <a:endParaRPr lang="de-DE" sz="1800" dirty="0">
-              <a:effectLst/>
-              <a:latin typeface="Calibri" panose="020F0502020204030204" pitchFamily="34" charset="0"/>
-              <a:ea typeface="Times New Roman" panose="02020603050405020304" pitchFamily="18" charset="0"/>
-              <a:cs typeface="Times New Roman" panose="02020603050405020304" pitchFamily="18" charset="0"/>
-            </a:endParaRPr>
-          </a:p>
-          <a:p>
-            <a:pPr>
-              <a:lnSpc>
-                <a:spcPct val="107000"/>
-              </a:lnSpc>
-              <a:spcAft>
-                <a:spcPts val="800"/>
-              </a:spcAft>
-            </a:pPr>
-            <a:r>
-              <a:rPr lang="en-GB" sz="1800" dirty="0">
-                <a:effectLst/>
-                <a:latin typeface="Calibri" panose="020F0502020204030204" pitchFamily="34" charset="0"/>
-                <a:ea typeface="Times New Roman" panose="02020603050405020304" pitchFamily="18" charset="0"/>
-                <a:cs typeface="Times New Roman" panose="02020603050405020304" pitchFamily="18" charset="0"/>
-              </a:rPr>
-              <a:t>Minimum amount of timeseries in all data:  8</a:t>
-            </a:r>
-            <a:endParaRPr lang="de-DE" sz="1800" dirty="0">
-              <a:effectLst/>
-              <a:latin typeface="Calibri" panose="020F0502020204030204" pitchFamily="34" charset="0"/>
-              <a:ea typeface="Times New Roman" panose="02020603050405020304" pitchFamily="18" charset="0"/>
-              <a:cs typeface="Times New Roman" panose="02020603050405020304" pitchFamily="18" charset="0"/>
-            </a:endParaRPr>
-          </a:p>
-          <a:p>
-            <a:pPr>
-              <a:lnSpc>
-                <a:spcPct val="107000"/>
-              </a:lnSpc>
-              <a:spcAft>
-                <a:spcPts val="800"/>
-              </a:spcAft>
-            </a:pPr>
-            <a:r>
-              <a:rPr lang="en-GB" sz="1800" dirty="0">
-                <a:effectLst/>
-                <a:latin typeface="Calibri" panose="020F0502020204030204" pitchFamily="34" charset="0"/>
-                <a:ea typeface="Times New Roman" panose="02020603050405020304" pitchFamily="18" charset="0"/>
-                <a:cs typeface="Times New Roman" panose="02020603050405020304" pitchFamily="18" charset="0"/>
-              </a:rPr>
-              <a:t>Maximum amount of timeseries in all data:  336</a:t>
-            </a:r>
-            <a:endParaRPr lang="de-DE" sz="1800" dirty="0">
-              <a:effectLst/>
-              <a:latin typeface="Calibri" panose="020F0502020204030204" pitchFamily="34" charset="0"/>
-              <a:ea typeface="Times New Roman" panose="02020603050405020304" pitchFamily="18" charset="0"/>
-              <a:cs typeface="Times New Roman" panose="02020603050405020304" pitchFamily="18" charset="0"/>
-            </a:endParaRPr>
-          </a:p>
-          <a:p>
-            <a:pPr>
-              <a:lnSpc>
-                <a:spcPct val="107000"/>
-              </a:lnSpc>
-              <a:spcAft>
-                <a:spcPts val="800"/>
-              </a:spcAft>
-            </a:pPr>
-            <a:r>
-              <a:rPr lang="en-GB" sz="1800" dirty="0">
-                <a:effectLst/>
-                <a:latin typeface="Calibri" panose="020F0502020204030204" pitchFamily="34" charset="0"/>
-                <a:ea typeface="Times New Roman" panose="02020603050405020304" pitchFamily="18" charset="0"/>
-                <a:cs typeface="Times New Roman" panose="02020603050405020304" pitchFamily="18" charset="0"/>
-              </a:rPr>
-              <a:t>Amount of timeseries in all data:  790215</a:t>
-            </a:r>
-            <a:endParaRPr lang="de-DE" sz="1800" dirty="0">
-              <a:effectLst/>
-              <a:latin typeface="Calibri" panose="020F0502020204030204" pitchFamily="34" charset="0"/>
-              <a:ea typeface="Times New Roman" panose="02020603050405020304" pitchFamily="18" charset="0"/>
-              <a:cs typeface="Times New Roman" panose="02020603050405020304" pitchFamily="18" charset="0"/>
-            </a:endParaRPr>
-          </a:p>
-          <a:p>
-            <a:pPr>
-              <a:lnSpc>
-                <a:spcPct val="107000"/>
-              </a:lnSpc>
-              <a:spcAft>
-                <a:spcPts val="800"/>
-              </a:spcAft>
-            </a:pPr>
-            <a:r>
-              <a:rPr lang="en-GB" sz="1800" dirty="0">
-                <a:effectLst/>
-                <a:latin typeface="Calibri" panose="020F0502020204030204" pitchFamily="34" charset="0"/>
-                <a:ea typeface="Times New Roman" panose="02020603050405020304" pitchFamily="18" charset="0"/>
-                <a:cs typeface="Times New Roman" panose="02020603050405020304" pitchFamily="18" charset="0"/>
-              </a:rPr>
-              <a:t>  </a:t>
-            </a:r>
-            <a:endParaRPr lang="de-DE" sz="1800" dirty="0">
-              <a:effectLst/>
-              <a:latin typeface="Calibri" panose="020F0502020204030204" pitchFamily="34" charset="0"/>
-              <a:ea typeface="Times New Roman" panose="02020603050405020304" pitchFamily="18" charset="0"/>
-              <a:cs typeface="Times New Roman" panose="02020603050405020304" pitchFamily="18" charset="0"/>
-            </a:endParaRPr>
+            <a:pPr algn="ctr"/>
+            <a:r>
+              <a:rPr lang="de-DE" dirty="0">
+                <a:solidFill>
+                  <a:schemeClr val="tx1"/>
+                </a:solidFill>
+              </a:rPr>
+              <a:t>Output</a:t>
+            </a:r>
           </a:p>
         </p:txBody>
       </p:sp>
     </p:spTree>
     <p:extLst>
       <p:ext uri="{BB962C8B-B14F-4D97-AF65-F5344CB8AC3E}">
-        <p14:creationId xmlns:p14="http://schemas.microsoft.com/office/powerpoint/2010/main" val="3333424829"/>
+        <p14:creationId xmlns:p14="http://schemas.microsoft.com/office/powerpoint/2010/main" val="3755114492"/>
       </p:ext>
     </p:extLst>
   </p:cSld>
@@ -7529,29 +8140,16 @@
           <a:p>
             <a:r>
               <a:rPr lang="de-DE" sz="4000" noProof="0" dirty="0"/>
-              <a:t>3. </a:t>
+              <a:t>2c) </a:t>
             </a:r>
             <a:r>
               <a:rPr lang="de-DE" sz="4000" noProof="0" dirty="0" err="1"/>
-              <a:t>Dimensionality</a:t>
+              <a:t>Timeseries</a:t>
             </a:r>
             <a:r>
               <a:rPr lang="de-DE" sz="4000" noProof="0" dirty="0"/>
-              <a:t> </a:t>
-            </a:r>
-            <a:r>
-              <a:rPr lang="de-DE" sz="4000" noProof="0" dirty="0" err="1"/>
-              <a:t>reduction</a:t>
-            </a:r>
-            <a:r>
-              <a:rPr lang="de-DE" sz="4000" noProof="0" dirty="0"/>
-              <a:t> </a:t>
-            </a:r>
-            <a:r>
-              <a:rPr lang="de-DE" sz="4000" noProof="0" dirty="0" err="1"/>
-              <a:t>techniques</a:t>
-            </a:r>
-            <a:endParaRPr lang="de-DE" sz="4000" noProof="0" dirty="0"/>
+              <a:t> Data</a:t>
+            </a:r>
           </a:p>
         </p:txBody>
       </p:sp>
@@ -7584,43 +8182,8 @@
           <a:lstStyle/>
           <a:p>
             <a:r>
-              <a:rPr lang="de-DE" sz="2400" noProof="0" dirty="0" err="1"/>
-              <a:t>Following</a:t>
-            </a:r>
-            <a:r>
-              <a:rPr lang="de-DE" sz="2400" noProof="0" dirty="0"/>
-              <a:t> </a:t>
-            </a:r>
-            <a:r>
-              <a:rPr lang="de-DE" sz="2400" noProof="0" dirty="0" err="1"/>
-              <a:t>the</a:t>
-            </a:r>
-            <a:r>
-              <a:rPr lang="de-DE" sz="2400" noProof="0" dirty="0"/>
-              <a:t> </a:t>
-            </a:r>
-            <a:r>
-              <a:rPr lang="de-DE" sz="2400" noProof="0" dirty="0" err="1"/>
-              <a:t>blogposts</a:t>
-            </a:r>
-            <a:r>
-              <a:rPr lang="de-DE" dirty="0"/>
-              <a:t>[2] </a:t>
-            </a:r>
-            <a:r>
               <a:rPr lang="de-DE" dirty="0" err="1"/>
-              <a:t>conclusion</a:t>
-            </a:r>
-            <a:r>
-              <a:rPr lang="de-DE" dirty="0"/>
-              <a:t>: </a:t>
-            </a:r>
-          </a:p>
-          <a:p>
-            <a:pPr lvl="1"/>
-            <a:r>
-              <a:rPr lang="de-DE" dirty="0" err="1"/>
-              <a:t>PaCMAP</a:t>
+              <a:t>Amount</a:t>
             </a:r>
             <a:r>
               <a:rPr lang="de-DE" dirty="0"/>
@@ -7628,7 +8191,7 @@
             </a:r>
             <a:r>
               <a:rPr lang="de-DE" dirty="0" err="1"/>
-              <a:t>is</a:t>
+              <a:t>of</a:t>
             </a:r>
             <a:r>
               <a:rPr lang="de-DE" dirty="0"/>
@@ -7636,7 +8199,15 @@
             </a:r>
             <a:r>
               <a:rPr lang="de-DE" dirty="0" err="1"/>
-              <a:t>most</a:t>
+              <a:t>Timeseries</a:t>
+            </a:r>
+            <a:r>
+              <a:rPr lang="de-DE" dirty="0"/>
+              <a:t> in </a:t>
+            </a:r>
+            <a:r>
+              <a:rPr lang="de-DE" dirty="0" err="1"/>
+              <a:t>the</a:t>
             </a:r>
             <a:r>
               <a:rPr lang="de-DE" dirty="0"/>
@@ -7644,41 +8215,19 @@
             </a:r>
             <a:r>
               <a:rPr lang="de-DE" dirty="0" err="1"/>
-              <a:t>suited</a:t>
+              <a:t>complete</a:t>
             </a:r>
             <a:r>
               <a:rPr lang="de-DE" dirty="0"/>
-              <a:t> </a:t>
-            </a:r>
-            <a:r>
-              <a:rPr lang="de-DE" dirty="0" err="1"/>
-              <a:t>for</a:t>
-            </a:r>
-            <a:r>
-              <a:rPr lang="de-DE" dirty="0"/>
-              <a:t> </a:t>
-            </a:r>
-            <a:r>
-              <a:rPr lang="de-DE" dirty="0" err="1"/>
-              <a:t>our</a:t>
-            </a:r>
-            <a:r>
-              <a:rPr lang="de-DE" dirty="0"/>
-              <a:t> </a:t>
-            </a:r>
-            <a:r>
-              <a:rPr lang="de-DE" dirty="0" err="1"/>
-              <a:t>dimensionality</a:t>
-            </a:r>
-            <a:r>
-              <a:rPr lang="de-DE" dirty="0"/>
-              <a:t> </a:t>
-            </a:r>
-            <a:r>
-              <a:rPr lang="de-DE" dirty="0" err="1"/>
-              <a:t>reduction</a:t>
-            </a:r>
-            <a:endParaRPr lang="de-DE" noProof="0" dirty="0"/>
+              <a:t> Dataset A</a:t>
+            </a:r>
+            <a:r>
+              <a:rPr lang="de-DE" sz="2400" noProof="0" dirty="0"/>
+              <a:t>:</a:t>
+            </a:r>
+          </a:p>
+          <a:p>
+            <a:endParaRPr lang="de-DE" sz="2400" noProof="0" dirty="0"/>
           </a:p>
         </p:txBody>
       </p:sp>
@@ -7754,7 +8303,7 @@
                 </a:solidFill>
                 <a:latin typeface="Frutiger Next LT W1G"/>
               </a:rPr>
-              <a:t>3. </a:t>
+              <a:t>2. Manual </a:t>
             </a:r>
             <a:r>
               <a:rPr lang="de-DE" sz="1200" dirty="0" err="1">
@@ -7765,7 +8314,7 @@
                 </a:solidFill>
                 <a:latin typeface="Frutiger Next LT W1G"/>
               </a:rPr>
-              <a:t>Dimensionality</a:t>
+              <a:t>data</a:t>
             </a:r>
             <a:r>
               <a:rPr lang="de-DE" sz="1200" dirty="0">
@@ -7787,29 +8336,7 @@
                 </a:solidFill>
                 <a:latin typeface="Frutiger Next LT W1G"/>
               </a:rPr>
-              <a:t>reduction</a:t>
-            </a:r>
-            <a:r>
-              <a:rPr lang="de-DE" sz="1200" dirty="0">
-                <a:solidFill>
-                  <a:schemeClr val="bg1">
-                    <a:lumMod val="50000"/>
-                  </a:schemeClr>
-                </a:solidFill>
-                <a:latin typeface="Frutiger Next LT W1G"/>
-              </a:rPr>
-              <a:t> </a:t>
-            </a:r>
-            <a:r>
-              <a:rPr lang="de-DE" sz="1200" dirty="0" err="1">
-                <a:solidFill>
-                  <a:schemeClr val="bg1">
-                    <a:lumMod val="50000"/>
-                  </a:schemeClr>
-                </a:solidFill>
-                <a:latin typeface="Frutiger Next LT W1G"/>
-              </a:rPr>
-              <a:t>techniques</a:t>
+              <a:t>exploration</a:t>
             </a:r>
             <a:endParaRPr lang="de-DE" sz="1200" dirty="0">
               <a:solidFill>
@@ -7822,103 +8349,194 @@
           </a:p>
         </p:txBody>
       </p:sp>
+      <p:sp>
+        <p:nvSpPr>
+          <p:cNvPr id="7" name="Textfeld 6">
+            <a:extLst>
+              <a:ext uri="{FF2B5EF4-FFF2-40B4-BE49-F238E27FC236}">
+                <a16:creationId xmlns:a16="http://schemas.microsoft.com/office/drawing/2014/main" id="{294E4BA2-991A-4788-8E84-B992F0B1D52C}"/>
+              </a:ext>
+            </a:extLst>
+          </p:cNvPr>
+          <p:cNvSpPr txBox="1"/>
+          <p:nvPr/>
+        </p:nvSpPr>
+        <p:spPr>
+          <a:xfrm>
+            <a:off x="1208846" y="3139562"/>
+            <a:ext cx="6115050" cy="1971374"/>
+          </a:xfrm>
+          <a:prstGeom prst="rect">
+            <a:avLst/>
+          </a:prstGeom>
+          <a:noFill/>
+        </p:spPr>
+        <p:txBody>
+          <a:bodyPr wrap="square">
+            <a:spAutoFit/>
+          </a:bodyPr>
+          <a:lstStyle/>
+          <a:p>
+            <a:pPr>
+              <a:lnSpc>
+                <a:spcPct val="107000"/>
+              </a:lnSpc>
+              <a:spcAft>
+                <a:spcPts val="800"/>
+              </a:spcAft>
+            </a:pPr>
+            <a:r>
+              <a:rPr lang="en-GB" sz="1800" dirty="0">
+                <a:effectLst/>
+                <a:latin typeface="Calibri" panose="020F0502020204030204" pitchFamily="34" charset="0"/>
+                <a:ea typeface="Times New Roman" panose="02020603050405020304" pitchFamily="18" charset="0"/>
+                <a:cs typeface="Times New Roman" panose="02020603050405020304" pitchFamily="18" charset="0"/>
+              </a:rPr>
+              <a:t>Average amount of timeseries in all data:  38.857</a:t>
+            </a:r>
+            <a:endParaRPr lang="de-DE" sz="1800" dirty="0">
+              <a:effectLst/>
+              <a:latin typeface="Calibri" panose="020F0502020204030204" pitchFamily="34" charset="0"/>
+              <a:ea typeface="Times New Roman" panose="02020603050405020304" pitchFamily="18" charset="0"/>
+              <a:cs typeface="Times New Roman" panose="02020603050405020304" pitchFamily="18" charset="0"/>
+            </a:endParaRPr>
+          </a:p>
+          <a:p>
+            <a:pPr>
+              <a:lnSpc>
+                <a:spcPct val="107000"/>
+              </a:lnSpc>
+              <a:spcAft>
+                <a:spcPts val="800"/>
+              </a:spcAft>
+            </a:pPr>
+            <a:r>
+              <a:rPr lang="en-GB" sz="1800" dirty="0">
+                <a:effectLst/>
+                <a:latin typeface="Calibri" panose="020F0502020204030204" pitchFamily="34" charset="0"/>
+                <a:ea typeface="Times New Roman" panose="02020603050405020304" pitchFamily="18" charset="0"/>
+                <a:cs typeface="Times New Roman" panose="02020603050405020304" pitchFamily="18" charset="0"/>
+              </a:rPr>
+              <a:t>Minimum amount of timeseries in all data:  8</a:t>
+            </a:r>
+            <a:endParaRPr lang="de-DE" sz="1800" dirty="0">
+              <a:effectLst/>
+              <a:latin typeface="Calibri" panose="020F0502020204030204" pitchFamily="34" charset="0"/>
+              <a:ea typeface="Times New Roman" panose="02020603050405020304" pitchFamily="18" charset="0"/>
+              <a:cs typeface="Times New Roman" panose="02020603050405020304" pitchFamily="18" charset="0"/>
+            </a:endParaRPr>
+          </a:p>
+          <a:p>
+            <a:pPr>
+              <a:lnSpc>
+                <a:spcPct val="107000"/>
+              </a:lnSpc>
+              <a:spcAft>
+                <a:spcPts val="800"/>
+              </a:spcAft>
+            </a:pPr>
+            <a:r>
+              <a:rPr lang="en-GB" sz="1800" dirty="0">
+                <a:effectLst/>
+                <a:latin typeface="Calibri" panose="020F0502020204030204" pitchFamily="34" charset="0"/>
+                <a:ea typeface="Times New Roman" panose="02020603050405020304" pitchFamily="18" charset="0"/>
+                <a:cs typeface="Times New Roman" panose="02020603050405020304" pitchFamily="18" charset="0"/>
+              </a:rPr>
+              <a:t>Maximum amount of timeseries in all data:  336</a:t>
+            </a:r>
+            <a:endParaRPr lang="de-DE" sz="1800" dirty="0">
+              <a:effectLst/>
+              <a:latin typeface="Calibri" panose="020F0502020204030204" pitchFamily="34" charset="0"/>
+              <a:ea typeface="Times New Roman" panose="02020603050405020304" pitchFamily="18" charset="0"/>
+              <a:cs typeface="Times New Roman" panose="02020603050405020304" pitchFamily="18" charset="0"/>
+            </a:endParaRPr>
+          </a:p>
+          <a:p>
+            <a:pPr>
+              <a:lnSpc>
+                <a:spcPct val="107000"/>
+              </a:lnSpc>
+              <a:spcAft>
+                <a:spcPts val="800"/>
+              </a:spcAft>
+            </a:pPr>
+            <a:r>
+              <a:rPr lang="en-GB" sz="1800" dirty="0">
+                <a:effectLst/>
+                <a:latin typeface="Calibri" panose="020F0502020204030204" pitchFamily="34" charset="0"/>
+                <a:ea typeface="Times New Roman" panose="02020603050405020304" pitchFamily="18" charset="0"/>
+                <a:cs typeface="Times New Roman" panose="02020603050405020304" pitchFamily="18" charset="0"/>
+              </a:rPr>
+              <a:t>Amount of timeseries in all data:  790215</a:t>
+            </a:r>
+            <a:endParaRPr lang="de-DE" sz="1800" dirty="0">
+              <a:effectLst/>
+              <a:latin typeface="Calibri" panose="020F0502020204030204" pitchFamily="34" charset="0"/>
+              <a:ea typeface="Times New Roman" panose="02020603050405020304" pitchFamily="18" charset="0"/>
+              <a:cs typeface="Times New Roman" panose="02020603050405020304" pitchFamily="18" charset="0"/>
+            </a:endParaRPr>
+          </a:p>
+          <a:p>
+            <a:pPr>
+              <a:lnSpc>
+                <a:spcPct val="107000"/>
+              </a:lnSpc>
+              <a:spcAft>
+                <a:spcPts val="800"/>
+              </a:spcAft>
+            </a:pPr>
+            <a:r>
+              <a:rPr lang="en-GB" sz="1800" dirty="0">
+                <a:effectLst/>
+                <a:latin typeface="Calibri" panose="020F0502020204030204" pitchFamily="34" charset="0"/>
+                <a:ea typeface="Times New Roman" panose="02020603050405020304" pitchFamily="18" charset="0"/>
+                <a:cs typeface="Times New Roman" panose="02020603050405020304" pitchFamily="18" charset="0"/>
+              </a:rPr>
+              <a:t>  </a:t>
+            </a:r>
+            <a:endParaRPr lang="de-DE" sz="1800" dirty="0">
+              <a:effectLst/>
+              <a:latin typeface="Calibri" panose="020F0502020204030204" pitchFamily="34" charset="0"/>
+              <a:ea typeface="Times New Roman" panose="02020603050405020304" pitchFamily="18" charset="0"/>
+              <a:cs typeface="Times New Roman" panose="02020603050405020304" pitchFamily="18" charset="0"/>
+            </a:endParaRPr>
+          </a:p>
+        </p:txBody>
+      </p:sp>
       <p:pic>
         <p:nvPicPr>
-          <p:cNvPr id="2050" name="Picture 2">
-            <a:extLst>
-              <a:ext uri="{FF2B5EF4-FFF2-40B4-BE49-F238E27FC236}">
-                <a16:creationId xmlns:a16="http://schemas.microsoft.com/office/drawing/2014/main" id="{6795B717-9243-4D6F-806B-919363BAA522}"/>
+          <p:cNvPr id="6" name="Grafik 5">
+            <a:extLst>
+              <a:ext uri="{FF2B5EF4-FFF2-40B4-BE49-F238E27FC236}">
+                <a16:creationId xmlns:a16="http://schemas.microsoft.com/office/drawing/2014/main" id="{D594B459-5108-4A7A-8B40-4E30BE2C50EB}"/>
               </a:ext>
             </a:extLst>
           </p:cNvPr>
           <p:cNvPicPr>
-            <a:picLocks noChangeAspect="1" noChangeArrowheads="1"/>
+            <a:picLocks noChangeAspect="1"/>
           </p:cNvPicPr>
           <p:nvPr/>
         </p:nvPicPr>
         <p:blipFill>
-          <a:blip r:embed="rId2">
-            <a:extLst>
-              <a:ext uri="{28A0092B-C50C-407E-A947-70E740481C1C}">
-                <a14:useLocalDpi xmlns:a14="http://schemas.microsoft.com/office/drawing/2010/main" val="0"/>
-              </a:ext>
-            </a:extLst>
-          </a:blip>
-          <a:srcRect/>
+          <a:blip r:embed="rId2"/>
           <a:stretch>
             <a:fillRect/>
           </a:stretch>
         </p:blipFill>
-        <p:spPr bwMode="auto">
-          <a:xfrm>
-            <a:off x="1928812" y="3038475"/>
-            <a:ext cx="8334375" cy="2457450"/>
+        <p:spPr>
+          <a:xfrm>
+            <a:off x="1037396" y="1491080"/>
+            <a:ext cx="6457950" cy="1390650"/>
           </a:xfrm>
           <a:prstGeom prst="rect">
             <a:avLst/>
           </a:prstGeom>
-          <a:noFill/>
-          <a:extLst>
-            <a:ext uri="{909E8E84-426E-40DD-AFC4-6F175D3DCCD1}">
-              <a14:hiddenFill xmlns:a14="http://schemas.microsoft.com/office/drawing/2010/main">
-                <a:solidFill>
-                  <a:srgbClr val="FFFFFF"/>
-                </a:solidFill>
-              </a14:hiddenFill>
-            </a:ext>
-          </a:extLst>
         </p:spPr>
       </p:pic>
-      <p:sp>
-        <p:nvSpPr>
-          <p:cNvPr id="8" name="Textfeld 7">
-            <a:extLst>
-              <a:ext uri="{FF2B5EF4-FFF2-40B4-BE49-F238E27FC236}">
-                <a16:creationId xmlns:a16="http://schemas.microsoft.com/office/drawing/2014/main" id="{41FFCAEB-485C-4DBD-B643-0B16DA2F0856}"/>
-              </a:ext>
-            </a:extLst>
-          </p:cNvPr>
-          <p:cNvSpPr txBox="1"/>
-          <p:nvPr/>
-        </p:nvSpPr>
-        <p:spPr>
-          <a:xfrm>
-            <a:off x="838200" y="6061858"/>
-            <a:ext cx="10572750" cy="338554"/>
-          </a:xfrm>
-          <a:prstGeom prst="rect">
-            <a:avLst/>
-          </a:prstGeom>
-          <a:noFill/>
-        </p:spPr>
-        <p:txBody>
-          <a:bodyPr wrap="square">
-            <a:spAutoFit/>
-          </a:bodyPr>
-          <a:lstStyle/>
-          <a:p>
-            <a:r>
-              <a:rPr lang="de-DE" sz="1600" noProof="0" dirty="0"/>
-              <a:t> [2] </a:t>
-            </a:r>
-            <a:r>
-              <a:rPr lang="de-DE" sz="1600" noProof="0" dirty="0">
-                <a:hlinkClick r:id="rId3"/>
-              </a:rPr>
-              <a:t>https://towardsdatascience.com/why-you-should-not-rely-on-t-sne-umap-or-trimap-f8f5dc333e59</a:t>
-            </a:r>
-            <a:r>
-              <a:rPr lang="de-DE" sz="1600" noProof="0" dirty="0"/>
-              <a:t> </a:t>
-            </a:r>
-            <a:endParaRPr lang="en-US" sz="1600" dirty="0"/>
-          </a:p>
-        </p:txBody>
-      </p:sp>
     </p:spTree>
     <p:extLst>
       <p:ext uri="{BB962C8B-B14F-4D97-AF65-F5344CB8AC3E}">
-        <p14:creationId xmlns:p14="http://schemas.microsoft.com/office/powerpoint/2010/main" val="3404387661"/>
+        <p14:creationId xmlns:p14="http://schemas.microsoft.com/office/powerpoint/2010/main" val="3333424829"/>
       </p:ext>
     </p:extLst>
   </p:cSld>
@@ -7970,11 +8588,11 @@
           <a:p>
             <a:r>
               <a:rPr lang="de-DE" sz="4000" noProof="0" dirty="0"/>
-              <a:t>4. Web </a:t>
+              <a:t>3. </a:t>
             </a:r>
             <a:r>
               <a:rPr lang="de-DE" sz="4000" noProof="0" dirty="0" err="1"/>
-              <a:t>app</a:t>
+              <a:t>Dimensionality</a:t>
             </a:r>
             <a:r>
               <a:rPr lang="de-DE" sz="4000" noProof="0" dirty="0"/>
@@ -7982,7 +8600,7 @@
             </a:r>
             <a:r>
               <a:rPr lang="de-DE" sz="4000" noProof="0" dirty="0" err="1"/>
-              <a:t>development</a:t>
+              <a:t>reduction</a:t>
             </a:r>
             <a:r>
               <a:rPr lang="de-DE" sz="4000" noProof="0" dirty="0"/>
@@ -7990,7 +8608,7 @@
             </a:r>
             <a:r>
               <a:rPr lang="de-DE" sz="4000" noProof="0" dirty="0" err="1"/>
-              <a:t>framework</a:t>
+              <a:t>techniques</a:t>
             </a:r>
             <a:endParaRPr lang="de-DE" sz="4000" noProof="0" dirty="0"/>
           </a:p>
@@ -8015,7 +8633,7 @@
         <p:spPr>
           <a:xfrm>
             <a:off x="838200" y="1035050"/>
-            <a:ext cx="10515600" cy="5321300"/>
+            <a:ext cx="10515600" cy="3693361"/>
           </a:xfrm>
         </p:spPr>
         <p:txBody>
@@ -8026,7 +8644,7 @@
           <a:p>
             <a:r>
               <a:rPr lang="de-DE" sz="2400" noProof="0" dirty="0" err="1"/>
-              <a:t>We</a:t>
+              <a:t>Following</a:t>
             </a:r>
             <a:r>
               <a:rPr lang="de-DE" sz="2400" noProof="0" dirty="0"/>
@@ -8034,7 +8652,7 @@
             </a:r>
             <a:r>
               <a:rPr lang="de-DE" sz="2400" noProof="0" dirty="0" err="1"/>
-              <a:t>chose</a:t>
+              <a:t>the</a:t>
             </a:r>
             <a:r>
               <a:rPr lang="de-DE" sz="2400" noProof="0" dirty="0"/>
@@ -8042,128 +8660,26 @@
             </a:r>
             <a:r>
               <a:rPr lang="de-DE" sz="2400" noProof="0" dirty="0" err="1"/>
-              <a:t>streamlit</a:t>
-            </a:r>
-            <a:r>
-              <a:rPr lang="de-DE" sz="2400" noProof="0" dirty="0"/>
-              <a:t> after </a:t>
-            </a:r>
-            <a:r>
-              <a:rPr lang="de-DE" sz="2400" noProof="0" dirty="0" err="1"/>
-              <a:t>comparing</a:t>
-            </a:r>
-            <a:r>
-              <a:rPr lang="de-DE" sz="2400" noProof="0" dirty="0"/>
-              <a:t> </a:t>
-            </a:r>
-            <a:r>
-              <a:rPr lang="de-DE" sz="2400" noProof="0" dirty="0" err="1"/>
-              <a:t>it</a:t>
-            </a:r>
-            <a:r>
-              <a:rPr lang="de-DE" sz="2400" noProof="0" dirty="0"/>
-              <a:t> </a:t>
-            </a:r>
-            <a:r>
-              <a:rPr lang="de-DE" sz="2400" noProof="0" dirty="0" err="1"/>
-              <a:t>to</a:t>
-            </a:r>
-            <a:r>
-              <a:rPr lang="de-DE" sz="2400" noProof="0" dirty="0"/>
-              <a:t> </a:t>
-            </a:r>
-            <a:r>
-              <a:rPr lang="de-DE" sz="2400" noProof="0" dirty="0" err="1"/>
-              <a:t>popular</a:t>
-            </a:r>
-            <a:r>
-              <a:rPr lang="de-DE" sz="2400" noProof="0" dirty="0"/>
-              <a:t> alternatives</a:t>
-            </a:r>
-            <a:endParaRPr lang="de-DE" dirty="0"/>
-          </a:p>
-          <a:p>
-            <a:pPr lvl="1"/>
-            <a:r>
-              <a:rPr lang="de-DE" noProof="0" dirty="0" err="1"/>
-              <a:t>Flask</a:t>
-            </a:r>
-            <a:r>
-              <a:rPr lang="de-DE" noProof="0" dirty="0"/>
-              <a:t>: </a:t>
-            </a:r>
-            <a:r>
-              <a:rPr lang="de-DE" noProof="0" dirty="0" err="1"/>
-              <a:t>Too</a:t>
-            </a:r>
-            <a:r>
-              <a:rPr lang="de-DE" noProof="0" dirty="0"/>
-              <a:t> </a:t>
-            </a:r>
-            <a:r>
-              <a:rPr lang="de-DE" noProof="0" dirty="0" err="1"/>
-              <a:t>unspecific</a:t>
-            </a:r>
-            <a:endParaRPr lang="de-DE" noProof="0" dirty="0"/>
-          </a:p>
-          <a:p>
-            <a:pPr lvl="1"/>
-            <a:endParaRPr lang="de-DE" dirty="0"/>
-          </a:p>
-          <a:p>
-            <a:pPr lvl="1"/>
-            <a:r>
-              <a:rPr lang="de-DE" noProof="0" dirty="0" err="1"/>
-              <a:t>Plotly</a:t>
-            </a:r>
-            <a:r>
-              <a:rPr lang="de-DE" noProof="0" dirty="0"/>
-              <a:t> </a:t>
-            </a:r>
-            <a:r>
-              <a:rPr lang="de-DE" noProof="0" dirty="0" err="1"/>
-              <a:t>combined</a:t>
-            </a:r>
-            <a:r>
-              <a:rPr lang="de-DE" noProof="0" dirty="0"/>
-              <a:t> in a </a:t>
-            </a:r>
-            <a:br>
-              <a:rPr lang="de-DE" noProof="0" dirty="0"/>
-            </a:br>
-            <a:r>
-              <a:rPr lang="de-DE" noProof="0" dirty="0" err="1"/>
-              <a:t>Webframe</a:t>
-            </a:r>
-            <a:r>
-              <a:rPr lang="de-DE" noProof="0" dirty="0"/>
-              <a:t> (JavaScript): Not </a:t>
-            </a:r>
-            <a:r>
-              <a:rPr lang="de-DE" noProof="0" dirty="0" err="1"/>
-              <a:t>efficient</a:t>
-            </a:r>
-            <a:endParaRPr lang="de-DE" noProof="0" dirty="0"/>
-          </a:p>
-          <a:p>
-            <a:pPr marL="457200" lvl="1" indent="0">
-              <a:buNone/>
-            </a:pPr>
-            <a:endParaRPr lang="de-DE" dirty="0"/>
-          </a:p>
-          <a:p>
-            <a:pPr lvl="1"/>
+              <a:t>blogposts</a:t>
+            </a:r>
+            <a:r>
+              <a:rPr lang="de-DE" dirty="0"/>
+              <a:t>[2] </a:t>
+            </a:r>
             <a:r>
               <a:rPr lang="de-DE" dirty="0" err="1"/>
-              <a:t>Streamlit</a:t>
+              <a:t>conclusion</a:t>
             </a:r>
             <a:r>
               <a:rPr lang="de-DE" dirty="0"/>
               <a:t>: </a:t>
             </a:r>
+          </a:p>
+          <a:p>
+            <a:pPr lvl="1"/>
             <a:r>
               <a:rPr lang="de-DE" dirty="0" err="1"/>
-              <a:t>Perfect</a:t>
+              <a:t>PaCMAP</a:t>
             </a:r>
             <a:r>
               <a:rPr lang="de-DE" dirty="0"/>
@@ -8171,18 +8687,7 @@
             </a:r>
             <a:r>
               <a:rPr lang="de-DE" dirty="0" err="1"/>
-              <a:t>solution</a:t>
-            </a:r>
-            <a:r>
-              <a:rPr lang="de-DE" dirty="0"/>
-              <a:t>,</a:t>
-            </a:r>
-            <a:br>
-              <a:rPr lang="de-DE" dirty="0"/>
-            </a:br>
-            <a:r>
-              <a:rPr lang="de-DE" dirty="0" err="1"/>
-              <a:t>specified</a:t>
+              <a:t>is</a:t>
             </a:r>
             <a:r>
               <a:rPr lang="de-DE" dirty="0"/>
@@ -8190,7 +8695,7 @@
             </a:r>
             <a:r>
               <a:rPr lang="de-DE" dirty="0" err="1"/>
-              <a:t>for</a:t>
+              <a:t>most</a:t>
             </a:r>
             <a:r>
               <a:rPr lang="de-DE" dirty="0"/>
@@ -8198,7 +8703,7 @@
             </a:r>
             <a:r>
               <a:rPr lang="de-DE" dirty="0" err="1"/>
-              <a:t>data</a:t>
+              <a:t>suited</a:t>
             </a:r>
             <a:r>
               <a:rPr lang="de-DE" dirty="0"/>
@@ -8206,18 +8711,31 @@
             </a:r>
             <a:r>
               <a:rPr lang="de-DE" dirty="0" err="1"/>
-              <a:t>analysis</a:t>
+              <a:t>for</a:t>
             </a:r>
             <a:r>
               <a:rPr lang="de-DE" dirty="0"/>
-              <a:t> and </a:t>
-            </a:r>
-            <a:br>
+              <a:t> </a:t>
+            </a:r>
+            <a:r>
+              <a:rPr lang="de-DE" dirty="0" err="1"/>
+              <a:t>our</a:t>
+            </a:r>
+            <a:r>
               <a:rPr lang="de-DE" dirty="0"/>
-            </a:br>
+              <a:t> </a:t>
+            </a:r>
             <a:r>
               <a:rPr lang="de-DE" dirty="0" err="1"/>
-              <a:t>visualization</a:t>
+              <a:t>dimensionality</a:t>
+            </a:r>
+            <a:r>
+              <a:rPr lang="de-DE" dirty="0"/>
+              <a:t> </a:t>
+            </a:r>
+            <a:r>
+              <a:rPr lang="de-DE" dirty="0" err="1"/>
+              <a:t>reduction</a:t>
             </a:r>
             <a:endParaRPr lang="de-DE" noProof="0" dirty="0"/>
           </a:p>
@@ -8295,7 +8813,7 @@
                 </a:solidFill>
                 <a:latin typeface="Frutiger Next LT W1G"/>
               </a:rPr>
-              <a:t>4. Web </a:t>
+              <a:t>3. </a:t>
             </a:r>
             <a:r>
               <a:rPr lang="de-DE" sz="1200" dirty="0" err="1">
@@ -8306,7 +8824,7 @@
                 </a:solidFill>
                 <a:latin typeface="Frutiger Next LT W1G"/>
               </a:rPr>
-              <a:t>app</a:t>
+              <a:t>Dimensionality</a:t>
             </a:r>
             <a:r>
               <a:rPr lang="de-DE" sz="1200" dirty="0">
@@ -8328,7 +8846,7 @@
                 </a:solidFill>
                 <a:latin typeface="Frutiger Next LT W1G"/>
               </a:rPr>
-              <a:t>development</a:t>
+              <a:t>reduction</a:t>
             </a:r>
             <a:r>
               <a:rPr lang="de-DE" sz="1200" dirty="0">
@@ -8350,7 +8868,7 @@
                 </a:solidFill>
                 <a:latin typeface="Frutiger Next LT W1G"/>
               </a:rPr>
-              <a:t>framework</a:t>
+              <a:t>techniques</a:t>
             </a:r>
             <a:endParaRPr lang="de-DE" sz="1200" dirty="0">
               <a:solidFill>
@@ -8365,76 +8883,101 @@
       </p:sp>
       <p:pic>
         <p:nvPicPr>
-          <p:cNvPr id="6" name="Grafik 5">
-            <a:extLst>
-              <a:ext uri="{FF2B5EF4-FFF2-40B4-BE49-F238E27FC236}">
-                <a16:creationId xmlns:a16="http://schemas.microsoft.com/office/drawing/2014/main" id="{FC646A03-F853-41D1-BB20-D4BF60AAD36E}"/>
+          <p:cNvPr id="2050" name="Picture 2">
+            <a:extLst>
+              <a:ext uri="{FF2B5EF4-FFF2-40B4-BE49-F238E27FC236}">
+                <a16:creationId xmlns:a16="http://schemas.microsoft.com/office/drawing/2014/main" id="{6795B717-9243-4D6F-806B-919363BAA522}"/>
               </a:ext>
             </a:extLst>
           </p:cNvPr>
           <p:cNvPicPr>
-            <a:picLocks noChangeAspect="1"/>
-          </p:cNvPicPr>
-          <p:nvPr/>
-        </p:nvPicPr>
-        <p:blipFill rotWithShape="1">
-          <a:blip r:embed="rId2"/>
-          <a:srcRect t="26429"/>
-          <a:stretch/>
-        </p:blipFill>
-        <p:spPr>
-          <a:xfrm>
-            <a:off x="5844161" y="3282561"/>
-            <a:ext cx="5774178" cy="2901422"/>
-          </a:xfrm>
-          <a:prstGeom prst="rect">
-            <a:avLst/>
-          </a:prstGeom>
-        </p:spPr>
-      </p:pic>
-      <p:pic>
-        <p:nvPicPr>
-          <p:cNvPr id="10" name="Grafik 9">
-            <a:extLst>
-              <a:ext uri="{FF2B5EF4-FFF2-40B4-BE49-F238E27FC236}">
-                <a16:creationId xmlns:a16="http://schemas.microsoft.com/office/drawing/2014/main" id="{3327FE70-63EA-4891-B319-9603CAEF164A}"/>
-              </a:ext>
-            </a:extLst>
-          </p:cNvPr>
-          <p:cNvPicPr>
-            <a:picLocks noChangeAspect="1"/>
+            <a:picLocks noChangeAspect="1" noChangeArrowheads="1"/>
           </p:cNvPicPr>
           <p:nvPr/>
         </p:nvPicPr>
         <p:blipFill>
-          <a:blip r:embed="rId3">
+          <a:blip r:embed="rId2">
             <a:extLst>
               <a:ext uri="{28A0092B-C50C-407E-A947-70E740481C1C}">
                 <a14:useLocalDpi xmlns:a14="http://schemas.microsoft.com/office/drawing/2010/main" val="0"/>
               </a:ext>
-              <a:ext uri="{96DAC541-7B7A-43D3-8B79-37D633B846F1}">
-                <asvg:svgBlip xmlns:asvg="http://schemas.microsoft.com/office/drawing/2016/SVG/main" r:embed="rId4"/>
-              </a:ext>
             </a:extLst>
           </a:blip>
+          <a:srcRect/>
           <a:stretch>
             <a:fillRect/>
           </a:stretch>
         </p:blipFill>
-        <p:spPr>
-          <a:xfrm>
-            <a:off x="7949673" y="2324390"/>
-            <a:ext cx="1563154" cy="914109"/>
+        <p:spPr bwMode="auto">
+          <a:xfrm>
+            <a:off x="1928812" y="3038475"/>
+            <a:ext cx="8334375" cy="2457450"/>
           </a:xfrm>
           <a:prstGeom prst="rect">
             <a:avLst/>
           </a:prstGeom>
+          <a:noFill/>
+          <a:extLst>
+            <a:ext uri="{909E8E84-426E-40DD-AFC4-6F175D3DCCD1}">
+              <a14:hiddenFill xmlns:a14="http://schemas.microsoft.com/office/drawing/2010/main">
+                <a:solidFill>
+                  <a:srgbClr val="FFFFFF"/>
+                </a:solidFill>
+              </a14:hiddenFill>
+            </a:ext>
+          </a:extLst>
         </p:spPr>
       </p:pic>
+      <p:sp>
+        <p:nvSpPr>
+          <p:cNvPr id="8" name="Textfeld 7">
+            <a:extLst>
+              <a:ext uri="{FF2B5EF4-FFF2-40B4-BE49-F238E27FC236}">
+                <a16:creationId xmlns:a16="http://schemas.microsoft.com/office/drawing/2014/main" id="{41FFCAEB-485C-4DBD-B643-0B16DA2F0856}"/>
+              </a:ext>
+            </a:extLst>
+          </p:cNvPr>
+          <p:cNvSpPr txBox="1"/>
+          <p:nvPr/>
+        </p:nvSpPr>
+        <p:spPr>
+          <a:xfrm>
+            <a:off x="838200" y="6061858"/>
+            <a:ext cx="10572750" cy="338554"/>
+          </a:xfrm>
+          <a:prstGeom prst="rect">
+            <a:avLst/>
+          </a:prstGeom>
+          <a:noFill/>
+        </p:spPr>
+        <p:txBody>
+          <a:bodyPr wrap="square">
+            <a:spAutoFit/>
+          </a:bodyPr>
+          <a:lstStyle/>
+          <a:p>
+            <a:r>
+              <a:rPr lang="de-DE" sz="1600" noProof="0" dirty="0"/>
+              <a:t> [2] </a:t>
+            </a:r>
+            <a:r>
+              <a:rPr lang="de-DE" sz="1600" noProof="0" dirty="0">
+                <a:hlinkClick r:id="rId3"/>
+              </a:rPr>
+              <a:t>https://towardsdatascience.com/why-you-should-not-rely-on-t-sne-umap-or-trimap-f8f5dc333e59</a:t>
+            </a:r>
+            <a:r>
+              <a:rPr lang="de-DE" sz="1600" noProof="0" dirty="0"/>
+              <a:t> </a:t>
+            </a:r>
+            <a:endParaRPr lang="en-US" sz="1600" dirty="0"/>
+          </a:p>
+        </p:txBody>
+      </p:sp>
     </p:spTree>
     <p:extLst>
       <p:ext uri="{BB962C8B-B14F-4D97-AF65-F5344CB8AC3E}">
-        <p14:creationId xmlns:p14="http://schemas.microsoft.com/office/powerpoint/2010/main" val="4105066178"/>
+        <p14:creationId xmlns:p14="http://schemas.microsoft.com/office/powerpoint/2010/main" val="3404387661"/>
       </p:ext>
     </p:extLst>
   </p:cSld>

</xml_diff>